<commit_message>
add sharebase links for videos
</commit_message>
<xml_diff>
--- a/ProgrammingWithPython.pptx
+++ b/ProgrammingWithPython.pptx
@@ -5,7 +5,7 @@
     <p:sldMasterId id="2147483648" r:id="rId1"/>
   </p:sldMasterIdLst>
   <p:notesMasterIdLst>
-    <p:notesMasterId r:id="rId16"/>
+    <p:notesMasterId r:id="rId18"/>
   </p:notesMasterIdLst>
   <p:sldIdLst>
     <p:sldId id="259" r:id="rId2"/>
@@ -22,6 +22,8 @@
     <p:sldId id="309" r:id="rId13"/>
     <p:sldId id="301" r:id="rId14"/>
     <p:sldId id="302" r:id="rId15"/>
+    <p:sldId id="308" r:id="rId16"/>
+    <p:sldId id="310" r:id="rId17"/>
   </p:sldIdLst>
   <p:sldSz cx="12192000" cy="6858000"/>
   <p:notesSz cx="6858000" cy="9144000"/>
@@ -221,7 +223,7 @@
           <a:p>
             <a:fld id="{19104133-B5B0-4351-8158-4F0E5EB1E2BF}" type="datetimeFigureOut">
               <a:rPr lang="en-US" smtClean="0"/>
-              <a:t>3/30/2021</a:t>
+              <a:t>5/19/2021</a:t>
             </a:fld>
             <a:endParaRPr lang="en-US"/>
           </a:p>
@@ -921,6 +923,157 @@
     <p:extLst>
       <p:ext uri="{BB962C8B-B14F-4D97-AF65-F5344CB8AC3E}">
         <p14:creationId xmlns:p14="http://schemas.microsoft.com/office/powerpoint/2010/main" val="1593956060"/>
+      </p:ext>
+    </p:extLst>
+  </p:cSld>
+  <p:clrMapOvr>
+    <a:masterClrMapping/>
+  </p:clrMapOvr>
+</p:notes>
+</file>
+
+<file path=ppt/notesSlides/notesSlide13.xml><?xml version="1.0" encoding="utf-8"?>
+<p:notes xmlns:a="http://schemas.openxmlformats.org/drawingml/2006/main" xmlns:r="http://schemas.openxmlformats.org/officeDocument/2006/relationships" xmlns:p="http://schemas.openxmlformats.org/presentationml/2006/main">
+  <p:cSld>
+    <p:spTree>
+      <p:nvGrpSpPr>
+        <p:cNvPr id="1" name=""/>
+        <p:cNvGrpSpPr/>
+        <p:nvPr/>
+      </p:nvGrpSpPr>
+      <p:grpSpPr>
+        <a:xfrm>
+          <a:off x="0" y="0"/>
+          <a:ext cx="0" cy="0"/>
+          <a:chOff x="0" y="0"/>
+          <a:chExt cx="0" cy="0"/>
+        </a:xfrm>
+      </p:grpSpPr>
+      <p:sp>
+        <p:nvSpPr>
+          <p:cNvPr id="2" name="Slide Image Placeholder 1"/>
+          <p:cNvSpPr>
+            <a:spLocks noGrp="1" noRot="1" noChangeAspect="1"/>
+          </p:cNvSpPr>
+          <p:nvPr>
+            <p:ph type="sldImg"/>
+          </p:nvPr>
+        </p:nvSpPr>
+        <p:spPr/>
+      </p:sp>
+      <p:sp>
+        <p:nvSpPr>
+          <p:cNvPr id="3" name="Notes Placeholder 2"/>
+          <p:cNvSpPr>
+            <a:spLocks noGrp="1"/>
+          </p:cNvSpPr>
+          <p:nvPr>
+            <p:ph type="body" idx="1"/>
+          </p:nvPr>
+        </p:nvSpPr>
+        <p:spPr/>
+        <p:txBody>
+          <a:bodyPr/>
+          <a:lstStyle/>
+          <a:p>
+            <a:r>
+              <a:rPr lang="en-US" dirty="0">
+                <a:solidFill>
+                  <a:schemeClr val="bg1"/>
+                </a:solidFill>
+              </a:rPr>
+              <a:t>The main point of this slide is to try encourage students. They may feel overwhelmed because this is a lot of information – but they should stick with it and know that they can learn if they put their mind to it!</a:t>
+            </a:r>
+          </a:p>
+        </p:txBody>
+      </p:sp>
+      <p:sp>
+        <p:nvSpPr>
+          <p:cNvPr id="4" name="Slide Number Placeholder 3"/>
+          <p:cNvSpPr>
+            <a:spLocks noGrp="1"/>
+          </p:cNvSpPr>
+          <p:nvPr>
+            <p:ph type="sldNum" sz="quarter" idx="5"/>
+          </p:nvPr>
+        </p:nvSpPr>
+        <p:spPr/>
+        <p:txBody>
+          <a:bodyPr/>
+          <a:lstStyle/>
+          <a:p>
+            <a:pPr marL="0" marR="0" lvl="0" indent="0" algn="r" defTabSz="914400" rtl="0" eaLnBrk="1" fontAlgn="auto" latinLnBrk="0" hangingPunct="1">
+              <a:lnSpc>
+                <a:spcPct val="100000"/>
+              </a:lnSpc>
+              <a:spcBef>
+                <a:spcPts val="0"/>
+              </a:spcBef>
+              <a:spcAft>
+                <a:spcPts val="0"/>
+              </a:spcAft>
+              <a:buClrTx/>
+              <a:buSzTx/>
+              <a:buFontTx/>
+              <a:buNone/>
+              <a:tabLst/>
+              <a:defRPr/>
+            </a:pPr>
+            <a:fld id="{DEC8F7F9-57EC-49CF-9FCD-2B781E4B449F}" type="slidenum">
+              <a:rPr kumimoji="0" lang="en-US" sz="1200" b="0" i="0" u="none" strike="noStrike" kern="1200" cap="none" spc="0" normalizeH="0" baseline="0" noProof="0" smtClean="0">
+                <a:ln>
+                  <a:noFill/>
+                </a:ln>
+                <a:solidFill>
+                  <a:prstClr val="black"/>
+                </a:solidFill>
+                <a:effectLst/>
+                <a:uLnTx/>
+                <a:uFillTx/>
+                <a:latin typeface="Calibri" panose="020F0502020204030204"/>
+                <a:ea typeface="+mn-ea"/>
+                <a:cs typeface="+mn-cs"/>
+              </a:rPr>
+              <a:pPr marL="0" marR="0" lvl="0" indent="0" algn="r" defTabSz="914400" rtl="0" eaLnBrk="1" fontAlgn="auto" latinLnBrk="0" hangingPunct="1">
+                <a:lnSpc>
+                  <a:spcPct val="100000"/>
+                </a:lnSpc>
+                <a:spcBef>
+                  <a:spcPts val="0"/>
+                </a:spcBef>
+                <a:spcAft>
+                  <a:spcPts val="0"/>
+                </a:spcAft>
+                <a:buClrTx/>
+                <a:buSzTx/>
+                <a:buFontTx/>
+                <a:buNone/>
+                <a:tabLst/>
+                <a:defRPr/>
+              </a:pPr>
+              <a:t>15</a:t>
+            </a:fld>
+            <a:endParaRPr kumimoji="0" lang="en-US" sz="1200" b="0" i="0" u="none" strike="noStrike" kern="1200" cap="none" spc="0" normalizeH="0" baseline="0" noProof="0">
+              <a:ln>
+                <a:noFill/>
+              </a:ln>
+              <a:solidFill>
+                <a:prstClr val="black"/>
+              </a:solidFill>
+              <a:effectLst/>
+              <a:uLnTx/>
+              <a:uFillTx/>
+              <a:latin typeface="Calibri" panose="020F0502020204030204"/>
+              <a:ea typeface="+mn-ea"/>
+              <a:cs typeface="+mn-cs"/>
+            </a:endParaRPr>
+          </a:p>
+        </p:txBody>
+      </p:sp>
+    </p:spTree>
+    <p:extLst>
+      <p:ext uri="{BB962C8B-B14F-4D97-AF65-F5344CB8AC3E}">
+        <p14:creationId xmlns:p14="http://schemas.microsoft.com/office/powerpoint/2010/main" val="544019711"/>
       </p:ext>
     </p:extLst>
   </p:cSld>
@@ -1925,7 +2078,7 @@
             <a:fld id="{1C2D31DE-C454-491C-B5C3-F097855E3DF7}" type="datetime4">
               <a:rPr lang="en-US" smtClean="0"/>
               <a:pPr/>
-              <a:t>March 30, 2021</a:t>
+              <a:t>May 19, 2021</a:t>
             </a:fld>
             <a:endParaRPr lang="en-US" dirty="0"/>
           </a:p>
@@ -5317,7 +5470,7 @@
           <a:p>
             <a:fld id="{5958763E-B898-436D-883D-03711491D54A}" type="datetimeFigureOut">
               <a:rPr lang="en-US" smtClean="0"/>
-              <a:t>3/30/2021</a:t>
+              <a:t>5/19/2021</a:t>
             </a:fld>
             <a:endParaRPr lang="en-US"/>
           </a:p>
@@ -5510,7 +5663,7 @@
           <a:p>
             <a:fld id="{5958763E-B898-436D-883D-03711491D54A}" type="datetimeFigureOut">
               <a:rPr lang="en-US" smtClean="0"/>
-              <a:t>3/30/2021</a:t>
+              <a:t>5/19/2021</a:t>
             </a:fld>
             <a:endParaRPr lang="en-US"/>
           </a:p>
@@ -5760,7 +5913,7 @@
           <a:p>
             <a:fld id="{5958763E-B898-436D-883D-03711491D54A}" type="datetimeFigureOut">
               <a:rPr lang="en-US" smtClean="0"/>
-              <a:t>3/30/2021</a:t>
+              <a:t>5/19/2021</a:t>
             </a:fld>
             <a:endParaRPr lang="en-US"/>
           </a:p>
@@ -6108,7 +6261,7 @@
           <a:p>
             <a:fld id="{5958763E-B898-436D-883D-03711491D54A}" type="datetimeFigureOut">
               <a:rPr lang="en-US" smtClean="0"/>
-              <a:t>3/30/2021</a:t>
+              <a:t>5/19/2021</a:t>
             </a:fld>
             <a:endParaRPr lang="en-US"/>
           </a:p>
@@ -6524,7 +6677,7 @@
           <a:p>
             <a:fld id="{5958763E-B898-436D-883D-03711491D54A}" type="datetimeFigureOut">
               <a:rPr lang="en-US" smtClean="0"/>
-              <a:t>3/30/2021</a:t>
+              <a:t>5/19/2021</a:t>
             </a:fld>
             <a:endParaRPr lang="en-US"/>
           </a:p>
@@ -7025,7 +7178,7 @@
           <a:p>
             <a:fld id="{5958763E-B898-436D-883D-03711491D54A}" type="datetimeFigureOut">
               <a:rPr lang="en-US" smtClean="0"/>
-              <a:t>3/30/2021</a:t>
+              <a:t>5/19/2021</a:t>
             </a:fld>
             <a:endParaRPr lang="en-US"/>
           </a:p>
@@ -7476,7 +7629,7 @@
           <a:p>
             <a:fld id="{5958763E-B898-436D-883D-03711491D54A}" type="datetimeFigureOut">
               <a:rPr lang="en-US" smtClean="0"/>
-              <a:t>3/30/2021</a:t>
+              <a:t>5/19/2021</a:t>
             </a:fld>
             <a:endParaRPr lang="en-US"/>
           </a:p>
@@ -8087,7 +8240,7 @@
           <a:p>
             <a:fld id="{5958763E-B898-436D-883D-03711491D54A}" type="datetimeFigureOut">
               <a:rPr lang="en-US" smtClean="0"/>
-              <a:t>3/30/2021</a:t>
+              <a:t>5/19/2021</a:t>
             </a:fld>
             <a:endParaRPr lang="en-US"/>
           </a:p>
@@ -8858,7 +9011,7 @@
           <a:p>
             <a:fld id="{5958763E-B898-436D-883D-03711491D54A}" type="datetimeFigureOut">
               <a:rPr lang="en-US" smtClean="0"/>
-              <a:t>3/30/2021</a:t>
+              <a:t>5/19/2021</a:t>
             </a:fld>
             <a:endParaRPr lang="en-US"/>
           </a:p>
@@ -8962,7 +9115,7 @@
           <a:p>
             <a:fld id="{5958763E-B898-436D-883D-03711491D54A}" type="datetimeFigureOut">
               <a:rPr lang="en-US" smtClean="0"/>
-              <a:t>3/30/2021</a:t>
+              <a:t>5/19/2021</a:t>
             </a:fld>
             <a:endParaRPr lang="en-US"/>
           </a:p>
@@ -9289,7 +9442,7 @@
             <a:fld id="{1C2D31DE-C454-491C-B5C3-F097855E3DF7}" type="datetime4">
               <a:rPr lang="en-US" smtClean="0"/>
               <a:pPr/>
-              <a:t>March 30, 2021</a:t>
+              <a:t>May 19, 2021</a:t>
             </a:fld>
             <a:endParaRPr lang="en-US" dirty="0"/>
           </a:p>
@@ -12441,7 +12594,7 @@
           <a:p>
             <a:fld id="{5958763E-B898-436D-883D-03711491D54A}" type="datetimeFigureOut">
               <a:rPr lang="en-US" smtClean="0"/>
-              <a:t>3/30/2021</a:t>
+              <a:t>5/19/2021</a:t>
             </a:fld>
             <a:endParaRPr lang="en-US"/>
           </a:p>
@@ -12565,7 +12718,7 @@
           <a:p>
             <a:fld id="{5958763E-B898-436D-883D-03711491D54A}" type="datetimeFigureOut">
               <a:rPr lang="en-US" smtClean="0"/>
-              <a:t>3/30/2021</a:t>
+              <a:t>5/19/2021</a:t>
             </a:fld>
             <a:endParaRPr lang="en-US"/>
           </a:p>
@@ -12689,7 +12842,7 @@
           <a:p>
             <a:fld id="{5958763E-B898-436D-883D-03711491D54A}" type="datetimeFigureOut">
               <a:rPr lang="en-US" smtClean="0"/>
-              <a:t>3/30/2021</a:t>
+              <a:t>5/19/2021</a:t>
             </a:fld>
             <a:endParaRPr lang="en-US"/>
           </a:p>
@@ -12813,7 +12966,7 @@
           <a:p>
             <a:fld id="{5958763E-B898-436D-883D-03711491D54A}" type="datetimeFigureOut">
               <a:rPr lang="en-US" smtClean="0"/>
-              <a:t>3/30/2021</a:t>
+              <a:t>5/19/2021</a:t>
             </a:fld>
             <a:endParaRPr lang="en-US"/>
           </a:p>
@@ -12937,7 +13090,7 @@
           <a:p>
             <a:fld id="{5958763E-B898-436D-883D-03711491D54A}" type="datetimeFigureOut">
               <a:rPr lang="en-US" smtClean="0"/>
-              <a:t>3/30/2021</a:t>
+              <a:t>5/19/2021</a:t>
             </a:fld>
             <a:endParaRPr lang="en-US"/>
           </a:p>
@@ -13061,7 +13214,7 @@
           <a:p>
             <a:fld id="{5958763E-B898-436D-883D-03711491D54A}" type="datetimeFigureOut">
               <a:rPr lang="en-US" smtClean="0"/>
-              <a:t>3/30/2021</a:t>
+              <a:t>5/19/2021</a:t>
             </a:fld>
             <a:endParaRPr lang="en-US"/>
           </a:p>
@@ -13185,7 +13338,7 @@
           <a:p>
             <a:fld id="{5958763E-B898-436D-883D-03711491D54A}" type="datetimeFigureOut">
               <a:rPr lang="en-US" smtClean="0"/>
-              <a:t>3/30/2021</a:t>
+              <a:t>5/19/2021</a:t>
             </a:fld>
             <a:endParaRPr lang="en-US"/>
           </a:p>
@@ -13309,7 +13462,7 @@
           <a:p>
             <a:fld id="{5958763E-B898-436D-883D-03711491D54A}" type="datetimeFigureOut">
               <a:rPr lang="en-US" smtClean="0"/>
-              <a:t>3/30/2021</a:t>
+              <a:t>5/19/2021</a:t>
             </a:fld>
             <a:endParaRPr lang="en-US"/>
           </a:p>
@@ -13442,7 +13595,7 @@
           <a:p>
             <a:fld id="{5958763E-B898-436D-883D-03711491D54A}" type="datetimeFigureOut">
               <a:rPr lang="en-US" smtClean="0"/>
-              <a:t>3/30/2021</a:t>
+              <a:t>5/19/2021</a:t>
             </a:fld>
             <a:endParaRPr lang="en-US"/>
           </a:p>
@@ -16781,7 +16934,7 @@
             <a:fld id="{1C2D31DE-C454-491C-B5C3-F097855E3DF7}" type="datetime4">
               <a:rPr lang="en-US" smtClean="0"/>
               <a:pPr/>
-              <a:t>March 30, 2021</a:t>
+              <a:t>May 19, 2021</a:t>
             </a:fld>
             <a:endParaRPr lang="en-US" dirty="0"/>
           </a:p>
@@ -29017,7 +29170,7 @@
           <a:p>
             <a:fld id="{5958763E-B898-436D-883D-03711491D54A}" type="datetimeFigureOut">
               <a:rPr lang="en-US" smtClean="0"/>
-              <a:t>3/30/2021</a:t>
+              <a:t>5/19/2021</a:t>
             </a:fld>
             <a:endParaRPr lang="en-US"/>
           </a:p>
@@ -29419,7 +29572,7 @@
           <a:p>
             <a:fld id="{5958763E-B898-436D-883D-03711491D54A}" type="datetimeFigureOut">
               <a:rPr lang="en-US" smtClean="0"/>
-              <a:t>3/30/2021</a:t>
+              <a:t>5/19/2021</a:t>
             </a:fld>
             <a:endParaRPr lang="en-US"/>
           </a:p>
@@ -29713,7 +29866,7 @@
           <a:p>
             <a:fld id="{5958763E-B898-436D-883D-03711491D54A}" type="datetimeFigureOut">
               <a:rPr lang="en-US" smtClean="0"/>
-              <a:t>3/30/2021</a:t>
+              <a:t>5/19/2021</a:t>
             </a:fld>
             <a:endParaRPr lang="en-US"/>
           </a:p>
@@ -29914,7 +30067,7 @@
           <a:p>
             <a:fld id="{5958763E-B898-436D-883D-03711491D54A}" type="datetimeFigureOut">
               <a:rPr lang="en-US" smtClean="0"/>
-              <a:t>3/30/2021</a:t>
+              <a:t>5/19/2021</a:t>
             </a:fld>
             <a:endParaRPr lang="en-US"/>
           </a:p>
@@ -30175,7 +30328,7 @@
           <a:p>
             <a:fld id="{5958763E-B898-436D-883D-03711491D54A}" type="datetimeFigureOut">
               <a:rPr lang="en-US" smtClean="0"/>
-              <a:t>3/30/2021</a:t>
+              <a:t>5/19/2021</a:t>
             </a:fld>
             <a:endParaRPr lang="en-US"/>
           </a:p>
@@ -30683,7 +30836,7 @@
           <a:p>
             <a:fld id="{5958763E-B898-436D-883D-03711491D54A}" type="datetimeFigureOut">
               <a:rPr lang="en-US" smtClean="0"/>
-              <a:t>3/30/2021</a:t>
+              <a:t>5/19/2021</a:t>
             </a:fld>
             <a:endParaRPr lang="en-US"/>
           </a:p>
@@ -31162,7 +31315,7 @@
           <a:p>
             <a:fld id="{5958763E-B898-436D-883D-03711491D54A}" type="datetimeFigureOut">
               <a:rPr lang="en-US" smtClean="0"/>
-              <a:t>3/30/2021</a:t>
+              <a:t>5/19/2021</a:t>
             </a:fld>
             <a:endParaRPr lang="en-US"/>
           </a:p>
@@ -31981,7 +32134,7 @@
           <a:p>
             <a:fld id="{5958763E-B898-436D-883D-03711491D54A}" type="datetimeFigureOut">
               <a:rPr lang="en-US" smtClean="0"/>
-              <a:t>3/30/2021</a:t>
+              <a:t>5/19/2021</a:t>
             </a:fld>
             <a:endParaRPr lang="en-US"/>
           </a:p>
@@ -32182,7 +32335,7 @@
           <a:p>
             <a:fld id="{5958763E-B898-436D-883D-03711491D54A}" type="datetimeFigureOut">
               <a:rPr lang="en-US" smtClean="0"/>
-              <a:t>3/30/2021</a:t>
+              <a:t>5/19/2021</a:t>
             </a:fld>
             <a:endParaRPr lang="en-US"/>
           </a:p>
@@ -32517,7 +32670,7 @@
           <a:p>
             <a:fld id="{5958763E-B898-436D-883D-03711491D54A}" type="datetimeFigureOut">
               <a:rPr lang="en-US" smtClean="0"/>
-              <a:t>3/30/2021</a:t>
+              <a:t>5/19/2021</a:t>
             </a:fld>
             <a:endParaRPr lang="en-US"/>
           </a:p>
@@ -32747,7 +32900,7 @@
           <a:p>
             <a:fld id="{5958763E-B898-436D-883D-03711491D54A}" type="datetimeFigureOut">
               <a:rPr lang="en-US" smtClean="0"/>
-              <a:t>3/30/2021</a:t>
+              <a:t>5/19/2021</a:t>
             </a:fld>
             <a:endParaRPr lang="en-US"/>
           </a:p>
@@ -32991,7 +33144,7 @@
           <a:p>
             <a:fld id="{5958763E-B898-436D-883D-03711491D54A}" type="datetimeFigureOut">
               <a:rPr lang="en-US" smtClean="0"/>
-              <a:t>3/30/2021</a:t>
+              <a:t>5/19/2021</a:t>
             </a:fld>
             <a:endParaRPr lang="en-US"/>
           </a:p>
@@ -36621,7 +36774,7 @@
           <a:p>
             <a:r>
               <a:rPr lang="en-US" dirty="0"/>
-              <a:t>This way, instead of writing 500 lines of code, only one line has to change</a:t>
+              <a:t>This way, instead of writing 500 lines of code, the same can be accomplished in just a few lines</a:t>
             </a:r>
           </a:p>
           <a:p>
@@ -38355,6 +38508,1132 @@
 </p:sld>
 </file>
 
+<file path=ppt/slides/slide15.xml><?xml version="1.0" encoding="utf-8"?>
+<p:sld xmlns:a="http://schemas.openxmlformats.org/drawingml/2006/main" xmlns:r="http://schemas.openxmlformats.org/officeDocument/2006/relationships" xmlns:p="http://schemas.openxmlformats.org/presentationml/2006/main">
+  <p:cSld>
+    <p:bg>
+      <p:bgPr>
+        <a:solidFill>
+          <a:schemeClr val="tx1">
+            <a:lumMod val="50000"/>
+          </a:schemeClr>
+        </a:solidFill>
+        <a:effectLst/>
+      </p:bgPr>
+    </p:bg>
+    <p:spTree>
+      <p:nvGrpSpPr>
+        <p:cNvPr id="1" name=""/>
+        <p:cNvGrpSpPr/>
+        <p:nvPr/>
+      </p:nvGrpSpPr>
+      <p:grpSpPr>
+        <a:xfrm>
+          <a:off x="0" y="0"/>
+          <a:ext cx="0" cy="0"/>
+          <a:chOff x="0" y="0"/>
+          <a:chExt cx="0" cy="0"/>
+        </a:xfrm>
+      </p:grpSpPr>
+      <p:sp>
+        <p:nvSpPr>
+          <p:cNvPr id="2" name="Title 1">
+            <a:extLst>
+              <a:ext uri="{FF2B5EF4-FFF2-40B4-BE49-F238E27FC236}">
+                <a16:creationId xmlns:a16="http://schemas.microsoft.com/office/drawing/2014/main" id="{3D9929B0-6B50-4382-AFD5-85CAF95884E2}"/>
+              </a:ext>
+            </a:extLst>
+          </p:cNvPr>
+          <p:cNvSpPr>
+            <a:spLocks noGrp="1"/>
+          </p:cNvSpPr>
+          <p:nvPr>
+            <p:ph type="title"/>
+          </p:nvPr>
+        </p:nvSpPr>
+        <p:spPr/>
+        <p:txBody>
+          <a:bodyPr/>
+          <a:lstStyle/>
+          <a:p>
+            <a:r>
+              <a:rPr lang="en-US" dirty="0">
+                <a:solidFill>
+                  <a:schemeClr val="tx1">
+                    <a:lumMod val="50000"/>
+                  </a:schemeClr>
+                </a:solidFill>
+              </a:rPr>
+              <a:t>Summary and Closing Remarks</a:t>
+            </a:r>
+          </a:p>
+        </p:txBody>
+      </p:sp>
+      <p:sp>
+        <p:nvSpPr>
+          <p:cNvPr id="3" name="Content Placeholder 2">
+            <a:extLst>
+              <a:ext uri="{FF2B5EF4-FFF2-40B4-BE49-F238E27FC236}">
+                <a16:creationId xmlns:a16="http://schemas.microsoft.com/office/drawing/2014/main" id="{FC6E5353-C281-457A-BDA8-C92D327FAA8B}"/>
+              </a:ext>
+            </a:extLst>
+          </p:cNvPr>
+          <p:cNvSpPr>
+            <a:spLocks noGrp="1"/>
+          </p:cNvSpPr>
+          <p:nvPr>
+            <p:ph idx="1"/>
+          </p:nvPr>
+        </p:nvSpPr>
+        <p:spPr>
+          <a:xfrm>
+            <a:off x="381000" y="1143000"/>
+            <a:ext cx="11430000" cy="3771900"/>
+          </a:xfrm>
+        </p:spPr>
+        <p:txBody>
+          <a:bodyPr anchor="ctr">
+            <a:normAutofit/>
+          </a:bodyPr>
+          <a:lstStyle/>
+          <a:p>
+            <a:r>
+              <a:rPr lang="en-US" sz="3200" b="1" dirty="0">
+                <a:solidFill>
+                  <a:schemeClr val="bg1"/>
+                </a:solidFill>
+              </a:rPr>
+              <a:t>Python</a:t>
+            </a:r>
+            <a:r>
+              <a:rPr lang="en-US" sz="3200" dirty="0">
+                <a:solidFill>
+                  <a:schemeClr val="bg1"/>
+                </a:solidFill>
+              </a:rPr>
+              <a:t> can be used to make lots of different things</a:t>
+            </a:r>
+          </a:p>
+          <a:p>
+            <a:r>
+              <a:rPr lang="en-US" sz="3200" b="1" dirty="0">
+                <a:solidFill>
+                  <a:schemeClr val="bg1"/>
+                </a:solidFill>
+              </a:rPr>
+              <a:t>Static string text values </a:t>
+            </a:r>
+            <a:r>
+              <a:rPr lang="en-US" sz="3200" dirty="0">
+                <a:solidFill>
+                  <a:schemeClr val="bg1"/>
+                </a:solidFill>
+              </a:rPr>
+              <a:t>go between quotes</a:t>
+            </a:r>
+          </a:p>
+          <a:p>
+            <a:r>
+              <a:rPr lang="en-US" sz="3200" b="1" dirty="0">
+                <a:solidFill>
+                  <a:schemeClr val="bg1"/>
+                </a:solidFill>
+              </a:rPr>
+              <a:t>Variables</a:t>
+            </a:r>
+            <a:r>
+              <a:rPr lang="en-US" sz="3200" dirty="0">
+                <a:solidFill>
+                  <a:schemeClr val="bg1"/>
+                </a:solidFill>
+              </a:rPr>
+              <a:t> are containers for data or objects</a:t>
+            </a:r>
+          </a:p>
+          <a:p>
+            <a:r>
+              <a:rPr lang="en-US" sz="3200" b="1" dirty="0">
+                <a:solidFill>
+                  <a:schemeClr val="bg1"/>
+                </a:solidFill>
+              </a:rPr>
+              <a:t>Loops</a:t>
+            </a:r>
+            <a:r>
+              <a:rPr lang="en-US" sz="3200" dirty="0">
+                <a:solidFill>
+                  <a:schemeClr val="bg1"/>
+                </a:solidFill>
+              </a:rPr>
+              <a:t> will repeat certain lines of code multiple times</a:t>
+            </a:r>
+          </a:p>
+          <a:p>
+            <a:r>
+              <a:rPr lang="en-US" sz="3200" dirty="0">
+                <a:solidFill>
+                  <a:schemeClr val="bg1"/>
+                </a:solidFill>
+              </a:rPr>
+              <a:t>This programming can feel intimidating – but </a:t>
+            </a:r>
+            <a:r>
+              <a:rPr lang="en-US" sz="3200" b="1" dirty="0">
+                <a:solidFill>
+                  <a:schemeClr val="bg1"/>
+                </a:solidFill>
+              </a:rPr>
+              <a:t>don’t worry</a:t>
+            </a:r>
+          </a:p>
+          <a:p>
+            <a:r>
+              <a:rPr lang="en-US" sz="3200" b="1" dirty="0">
+                <a:solidFill>
+                  <a:schemeClr val="bg1"/>
+                </a:solidFill>
+              </a:rPr>
+              <a:t>You can do it!</a:t>
+            </a:r>
+          </a:p>
+        </p:txBody>
+      </p:sp>
+      <p:pic>
+        <p:nvPicPr>
+          <p:cNvPr id="7170" name="Picture 2" descr="Supportive snake | Kirishima eijirou, Story inspiration, Arcanum">
+            <a:extLst>
+              <a:ext uri="{FF2B5EF4-FFF2-40B4-BE49-F238E27FC236}">
+                <a16:creationId xmlns:a16="http://schemas.microsoft.com/office/drawing/2014/main" id="{5F300B28-0ABC-4B90-BC93-FAD74B7BFD6F}"/>
+              </a:ext>
+            </a:extLst>
+          </p:cNvPr>
+          <p:cNvPicPr>
+            <a:picLocks noChangeAspect="1" noChangeArrowheads="1"/>
+          </p:cNvPicPr>
+          <p:nvPr/>
+        </p:nvPicPr>
+        <p:blipFill rotWithShape="1">
+          <a:blip r:embed="rId3">
+            <a:extLst>
+              <a:ext uri="{28A0092B-C50C-407E-A947-70E740481C1C}">
+                <a14:useLocalDpi xmlns:a14="http://schemas.microsoft.com/office/drawing/2010/main" val="0"/>
+              </a:ext>
+            </a:extLst>
+          </a:blip>
+          <a:srcRect t="23333" b="18334"/>
+          <a:stretch/>
+        </p:blipFill>
+        <p:spPr bwMode="auto">
+          <a:xfrm>
+            <a:off x="3924300" y="4338328"/>
+            <a:ext cx="7104062" cy="2753343"/>
+          </a:xfrm>
+          <a:prstGeom prst="rect">
+            <a:avLst/>
+          </a:prstGeom>
+          <a:noFill/>
+          <a:extLst>
+            <a:ext uri="{909E8E84-426E-40DD-AFC4-6F175D3DCCD1}">
+              <a14:hiddenFill xmlns:a14="http://schemas.microsoft.com/office/drawing/2010/main">
+                <a:solidFill>
+                  <a:srgbClr val="FFFFFF"/>
+                </a:solidFill>
+              </a14:hiddenFill>
+            </a:ext>
+          </a:extLst>
+        </p:spPr>
+      </p:pic>
+    </p:spTree>
+    <p:extLst>
+      <p:ext uri="{BB962C8B-B14F-4D97-AF65-F5344CB8AC3E}">
+        <p14:creationId xmlns:p14="http://schemas.microsoft.com/office/powerpoint/2010/main" val="495570243"/>
+      </p:ext>
+    </p:extLst>
+  </p:cSld>
+  <p:clrMapOvr>
+    <a:masterClrMapping/>
+  </p:clrMapOvr>
+  <p:transition>
+    <p:fade/>
+  </p:transition>
+  <p:timing>
+    <p:tnLst>
+      <p:par>
+        <p:cTn id="1" dur="indefinite" restart="never" nodeType="tmRoot">
+          <p:childTnLst>
+            <p:seq concurrent="1" nextAc="seek">
+              <p:cTn id="2" dur="indefinite" nodeType="mainSeq">
+                <p:childTnLst>
+                  <p:par>
+                    <p:cTn id="3" fill="hold">
+                      <p:stCondLst>
+                        <p:cond delay="indefinite"/>
+                      </p:stCondLst>
+                      <p:childTnLst>
+                        <p:par>
+                          <p:cTn id="4" fill="hold">
+                            <p:stCondLst>
+                              <p:cond delay="0"/>
+                            </p:stCondLst>
+                            <p:childTnLst>
+                              <p:par>
+                                <p:cTn id="5" presetID="42" presetClass="entr" presetSubtype="0" fill="hold" grpId="0" nodeType="clickEffect">
+                                  <p:stCondLst>
+                                    <p:cond delay="0"/>
+                                  </p:stCondLst>
+                                  <p:childTnLst>
+                                    <p:set>
+                                      <p:cBhvr>
+                                        <p:cTn id="6" dur="1" fill="hold">
+                                          <p:stCondLst>
+                                            <p:cond delay="0"/>
+                                          </p:stCondLst>
+                                        </p:cTn>
+                                        <p:tgtEl>
+                                          <p:spTgt spid="3">
+                                            <p:txEl>
+                                              <p:pRg st="0" end="0"/>
+                                            </p:txEl>
+                                          </p:spTgt>
+                                        </p:tgtEl>
+                                        <p:attrNameLst>
+                                          <p:attrName>style.visibility</p:attrName>
+                                        </p:attrNameLst>
+                                      </p:cBhvr>
+                                      <p:to>
+                                        <p:strVal val="visible"/>
+                                      </p:to>
+                                    </p:set>
+                                    <p:animEffect transition="in" filter="fade">
+                                      <p:cBhvr>
+                                        <p:cTn id="7" dur="500"/>
+                                        <p:tgtEl>
+                                          <p:spTgt spid="3">
+                                            <p:txEl>
+                                              <p:pRg st="0" end="0"/>
+                                            </p:txEl>
+                                          </p:spTgt>
+                                        </p:tgtEl>
+                                      </p:cBhvr>
+                                    </p:animEffect>
+                                    <p:anim calcmode="lin" valueType="num">
+                                      <p:cBhvr>
+                                        <p:cTn id="8" dur="500" fill="hold"/>
+                                        <p:tgtEl>
+                                          <p:spTgt spid="3">
+                                            <p:txEl>
+                                              <p:pRg st="0" end="0"/>
+                                            </p:txEl>
+                                          </p:spTgt>
+                                        </p:tgtEl>
+                                        <p:attrNameLst>
+                                          <p:attrName>ppt_x</p:attrName>
+                                        </p:attrNameLst>
+                                      </p:cBhvr>
+                                      <p:tavLst>
+                                        <p:tav tm="0">
+                                          <p:val>
+                                            <p:strVal val="#ppt_x"/>
+                                          </p:val>
+                                        </p:tav>
+                                        <p:tav tm="100000">
+                                          <p:val>
+                                            <p:strVal val="#ppt_x"/>
+                                          </p:val>
+                                        </p:tav>
+                                      </p:tavLst>
+                                    </p:anim>
+                                    <p:anim calcmode="lin" valueType="num">
+                                      <p:cBhvr>
+                                        <p:cTn id="9" dur="500" fill="hold"/>
+                                        <p:tgtEl>
+                                          <p:spTgt spid="3">
+                                            <p:txEl>
+                                              <p:pRg st="0" end="0"/>
+                                            </p:txEl>
+                                          </p:spTgt>
+                                        </p:tgtEl>
+                                        <p:attrNameLst>
+                                          <p:attrName>ppt_y</p:attrName>
+                                        </p:attrNameLst>
+                                      </p:cBhvr>
+                                      <p:tavLst>
+                                        <p:tav tm="0">
+                                          <p:val>
+                                            <p:strVal val="#ppt_y+.1"/>
+                                          </p:val>
+                                        </p:tav>
+                                        <p:tav tm="100000">
+                                          <p:val>
+                                            <p:strVal val="#ppt_y"/>
+                                          </p:val>
+                                        </p:tav>
+                                      </p:tavLst>
+                                    </p:anim>
+                                  </p:childTnLst>
+                                </p:cTn>
+                              </p:par>
+                            </p:childTnLst>
+                          </p:cTn>
+                        </p:par>
+                      </p:childTnLst>
+                    </p:cTn>
+                  </p:par>
+                  <p:par>
+                    <p:cTn id="10" fill="hold">
+                      <p:stCondLst>
+                        <p:cond delay="indefinite"/>
+                      </p:stCondLst>
+                      <p:childTnLst>
+                        <p:par>
+                          <p:cTn id="11" fill="hold">
+                            <p:stCondLst>
+                              <p:cond delay="0"/>
+                            </p:stCondLst>
+                            <p:childTnLst>
+                              <p:par>
+                                <p:cTn id="12" presetID="42" presetClass="entr" presetSubtype="0" fill="hold" grpId="0" nodeType="clickEffect">
+                                  <p:stCondLst>
+                                    <p:cond delay="0"/>
+                                  </p:stCondLst>
+                                  <p:childTnLst>
+                                    <p:set>
+                                      <p:cBhvr>
+                                        <p:cTn id="13" dur="1" fill="hold">
+                                          <p:stCondLst>
+                                            <p:cond delay="0"/>
+                                          </p:stCondLst>
+                                        </p:cTn>
+                                        <p:tgtEl>
+                                          <p:spTgt spid="3">
+                                            <p:txEl>
+                                              <p:pRg st="1" end="1"/>
+                                            </p:txEl>
+                                          </p:spTgt>
+                                        </p:tgtEl>
+                                        <p:attrNameLst>
+                                          <p:attrName>style.visibility</p:attrName>
+                                        </p:attrNameLst>
+                                      </p:cBhvr>
+                                      <p:to>
+                                        <p:strVal val="visible"/>
+                                      </p:to>
+                                    </p:set>
+                                    <p:animEffect transition="in" filter="fade">
+                                      <p:cBhvr>
+                                        <p:cTn id="14" dur="500"/>
+                                        <p:tgtEl>
+                                          <p:spTgt spid="3">
+                                            <p:txEl>
+                                              <p:pRg st="1" end="1"/>
+                                            </p:txEl>
+                                          </p:spTgt>
+                                        </p:tgtEl>
+                                      </p:cBhvr>
+                                    </p:animEffect>
+                                    <p:anim calcmode="lin" valueType="num">
+                                      <p:cBhvr>
+                                        <p:cTn id="15" dur="500" fill="hold"/>
+                                        <p:tgtEl>
+                                          <p:spTgt spid="3">
+                                            <p:txEl>
+                                              <p:pRg st="1" end="1"/>
+                                            </p:txEl>
+                                          </p:spTgt>
+                                        </p:tgtEl>
+                                        <p:attrNameLst>
+                                          <p:attrName>ppt_x</p:attrName>
+                                        </p:attrNameLst>
+                                      </p:cBhvr>
+                                      <p:tavLst>
+                                        <p:tav tm="0">
+                                          <p:val>
+                                            <p:strVal val="#ppt_x"/>
+                                          </p:val>
+                                        </p:tav>
+                                        <p:tav tm="100000">
+                                          <p:val>
+                                            <p:strVal val="#ppt_x"/>
+                                          </p:val>
+                                        </p:tav>
+                                      </p:tavLst>
+                                    </p:anim>
+                                    <p:anim calcmode="lin" valueType="num">
+                                      <p:cBhvr>
+                                        <p:cTn id="16" dur="500" fill="hold"/>
+                                        <p:tgtEl>
+                                          <p:spTgt spid="3">
+                                            <p:txEl>
+                                              <p:pRg st="1" end="1"/>
+                                            </p:txEl>
+                                          </p:spTgt>
+                                        </p:tgtEl>
+                                        <p:attrNameLst>
+                                          <p:attrName>ppt_y</p:attrName>
+                                        </p:attrNameLst>
+                                      </p:cBhvr>
+                                      <p:tavLst>
+                                        <p:tav tm="0">
+                                          <p:val>
+                                            <p:strVal val="#ppt_y+.1"/>
+                                          </p:val>
+                                        </p:tav>
+                                        <p:tav tm="100000">
+                                          <p:val>
+                                            <p:strVal val="#ppt_y"/>
+                                          </p:val>
+                                        </p:tav>
+                                      </p:tavLst>
+                                    </p:anim>
+                                  </p:childTnLst>
+                                </p:cTn>
+                              </p:par>
+                            </p:childTnLst>
+                          </p:cTn>
+                        </p:par>
+                      </p:childTnLst>
+                    </p:cTn>
+                  </p:par>
+                  <p:par>
+                    <p:cTn id="17" fill="hold">
+                      <p:stCondLst>
+                        <p:cond delay="indefinite"/>
+                      </p:stCondLst>
+                      <p:childTnLst>
+                        <p:par>
+                          <p:cTn id="18" fill="hold">
+                            <p:stCondLst>
+                              <p:cond delay="0"/>
+                            </p:stCondLst>
+                            <p:childTnLst>
+                              <p:par>
+                                <p:cTn id="19" presetID="42" presetClass="entr" presetSubtype="0" fill="hold" grpId="0" nodeType="clickEffect">
+                                  <p:stCondLst>
+                                    <p:cond delay="0"/>
+                                  </p:stCondLst>
+                                  <p:childTnLst>
+                                    <p:set>
+                                      <p:cBhvr>
+                                        <p:cTn id="20" dur="1" fill="hold">
+                                          <p:stCondLst>
+                                            <p:cond delay="0"/>
+                                          </p:stCondLst>
+                                        </p:cTn>
+                                        <p:tgtEl>
+                                          <p:spTgt spid="3">
+                                            <p:txEl>
+                                              <p:pRg st="2" end="2"/>
+                                            </p:txEl>
+                                          </p:spTgt>
+                                        </p:tgtEl>
+                                        <p:attrNameLst>
+                                          <p:attrName>style.visibility</p:attrName>
+                                        </p:attrNameLst>
+                                      </p:cBhvr>
+                                      <p:to>
+                                        <p:strVal val="visible"/>
+                                      </p:to>
+                                    </p:set>
+                                    <p:animEffect transition="in" filter="fade">
+                                      <p:cBhvr>
+                                        <p:cTn id="21" dur="500"/>
+                                        <p:tgtEl>
+                                          <p:spTgt spid="3">
+                                            <p:txEl>
+                                              <p:pRg st="2" end="2"/>
+                                            </p:txEl>
+                                          </p:spTgt>
+                                        </p:tgtEl>
+                                      </p:cBhvr>
+                                    </p:animEffect>
+                                    <p:anim calcmode="lin" valueType="num">
+                                      <p:cBhvr>
+                                        <p:cTn id="22" dur="500" fill="hold"/>
+                                        <p:tgtEl>
+                                          <p:spTgt spid="3">
+                                            <p:txEl>
+                                              <p:pRg st="2" end="2"/>
+                                            </p:txEl>
+                                          </p:spTgt>
+                                        </p:tgtEl>
+                                        <p:attrNameLst>
+                                          <p:attrName>ppt_x</p:attrName>
+                                        </p:attrNameLst>
+                                      </p:cBhvr>
+                                      <p:tavLst>
+                                        <p:tav tm="0">
+                                          <p:val>
+                                            <p:strVal val="#ppt_x"/>
+                                          </p:val>
+                                        </p:tav>
+                                        <p:tav tm="100000">
+                                          <p:val>
+                                            <p:strVal val="#ppt_x"/>
+                                          </p:val>
+                                        </p:tav>
+                                      </p:tavLst>
+                                    </p:anim>
+                                    <p:anim calcmode="lin" valueType="num">
+                                      <p:cBhvr>
+                                        <p:cTn id="23" dur="500" fill="hold"/>
+                                        <p:tgtEl>
+                                          <p:spTgt spid="3">
+                                            <p:txEl>
+                                              <p:pRg st="2" end="2"/>
+                                            </p:txEl>
+                                          </p:spTgt>
+                                        </p:tgtEl>
+                                        <p:attrNameLst>
+                                          <p:attrName>ppt_y</p:attrName>
+                                        </p:attrNameLst>
+                                      </p:cBhvr>
+                                      <p:tavLst>
+                                        <p:tav tm="0">
+                                          <p:val>
+                                            <p:strVal val="#ppt_y+.1"/>
+                                          </p:val>
+                                        </p:tav>
+                                        <p:tav tm="100000">
+                                          <p:val>
+                                            <p:strVal val="#ppt_y"/>
+                                          </p:val>
+                                        </p:tav>
+                                      </p:tavLst>
+                                    </p:anim>
+                                  </p:childTnLst>
+                                </p:cTn>
+                              </p:par>
+                            </p:childTnLst>
+                          </p:cTn>
+                        </p:par>
+                      </p:childTnLst>
+                    </p:cTn>
+                  </p:par>
+                  <p:par>
+                    <p:cTn id="24" fill="hold">
+                      <p:stCondLst>
+                        <p:cond delay="indefinite"/>
+                      </p:stCondLst>
+                      <p:childTnLst>
+                        <p:par>
+                          <p:cTn id="25" fill="hold">
+                            <p:stCondLst>
+                              <p:cond delay="0"/>
+                            </p:stCondLst>
+                            <p:childTnLst>
+                              <p:par>
+                                <p:cTn id="26" presetID="42" presetClass="entr" presetSubtype="0" fill="hold" grpId="0" nodeType="clickEffect">
+                                  <p:stCondLst>
+                                    <p:cond delay="0"/>
+                                  </p:stCondLst>
+                                  <p:childTnLst>
+                                    <p:set>
+                                      <p:cBhvr>
+                                        <p:cTn id="27" dur="1" fill="hold">
+                                          <p:stCondLst>
+                                            <p:cond delay="0"/>
+                                          </p:stCondLst>
+                                        </p:cTn>
+                                        <p:tgtEl>
+                                          <p:spTgt spid="3">
+                                            <p:txEl>
+                                              <p:pRg st="3" end="3"/>
+                                            </p:txEl>
+                                          </p:spTgt>
+                                        </p:tgtEl>
+                                        <p:attrNameLst>
+                                          <p:attrName>style.visibility</p:attrName>
+                                        </p:attrNameLst>
+                                      </p:cBhvr>
+                                      <p:to>
+                                        <p:strVal val="visible"/>
+                                      </p:to>
+                                    </p:set>
+                                    <p:animEffect transition="in" filter="fade">
+                                      <p:cBhvr>
+                                        <p:cTn id="28" dur="500"/>
+                                        <p:tgtEl>
+                                          <p:spTgt spid="3">
+                                            <p:txEl>
+                                              <p:pRg st="3" end="3"/>
+                                            </p:txEl>
+                                          </p:spTgt>
+                                        </p:tgtEl>
+                                      </p:cBhvr>
+                                    </p:animEffect>
+                                    <p:anim calcmode="lin" valueType="num">
+                                      <p:cBhvr>
+                                        <p:cTn id="29" dur="500" fill="hold"/>
+                                        <p:tgtEl>
+                                          <p:spTgt spid="3">
+                                            <p:txEl>
+                                              <p:pRg st="3" end="3"/>
+                                            </p:txEl>
+                                          </p:spTgt>
+                                        </p:tgtEl>
+                                        <p:attrNameLst>
+                                          <p:attrName>ppt_x</p:attrName>
+                                        </p:attrNameLst>
+                                      </p:cBhvr>
+                                      <p:tavLst>
+                                        <p:tav tm="0">
+                                          <p:val>
+                                            <p:strVal val="#ppt_x"/>
+                                          </p:val>
+                                        </p:tav>
+                                        <p:tav tm="100000">
+                                          <p:val>
+                                            <p:strVal val="#ppt_x"/>
+                                          </p:val>
+                                        </p:tav>
+                                      </p:tavLst>
+                                    </p:anim>
+                                    <p:anim calcmode="lin" valueType="num">
+                                      <p:cBhvr>
+                                        <p:cTn id="30" dur="500" fill="hold"/>
+                                        <p:tgtEl>
+                                          <p:spTgt spid="3">
+                                            <p:txEl>
+                                              <p:pRg st="3" end="3"/>
+                                            </p:txEl>
+                                          </p:spTgt>
+                                        </p:tgtEl>
+                                        <p:attrNameLst>
+                                          <p:attrName>ppt_y</p:attrName>
+                                        </p:attrNameLst>
+                                      </p:cBhvr>
+                                      <p:tavLst>
+                                        <p:tav tm="0">
+                                          <p:val>
+                                            <p:strVal val="#ppt_y+.1"/>
+                                          </p:val>
+                                        </p:tav>
+                                        <p:tav tm="100000">
+                                          <p:val>
+                                            <p:strVal val="#ppt_y"/>
+                                          </p:val>
+                                        </p:tav>
+                                      </p:tavLst>
+                                    </p:anim>
+                                  </p:childTnLst>
+                                </p:cTn>
+                              </p:par>
+                            </p:childTnLst>
+                          </p:cTn>
+                        </p:par>
+                      </p:childTnLst>
+                    </p:cTn>
+                  </p:par>
+                  <p:par>
+                    <p:cTn id="31" fill="hold">
+                      <p:stCondLst>
+                        <p:cond delay="indefinite"/>
+                      </p:stCondLst>
+                      <p:childTnLst>
+                        <p:par>
+                          <p:cTn id="32" fill="hold">
+                            <p:stCondLst>
+                              <p:cond delay="0"/>
+                            </p:stCondLst>
+                            <p:childTnLst>
+                              <p:par>
+                                <p:cTn id="33" presetID="42" presetClass="entr" presetSubtype="0" fill="hold" grpId="0" nodeType="clickEffect">
+                                  <p:stCondLst>
+                                    <p:cond delay="0"/>
+                                  </p:stCondLst>
+                                  <p:childTnLst>
+                                    <p:set>
+                                      <p:cBhvr>
+                                        <p:cTn id="34" dur="1" fill="hold">
+                                          <p:stCondLst>
+                                            <p:cond delay="0"/>
+                                          </p:stCondLst>
+                                        </p:cTn>
+                                        <p:tgtEl>
+                                          <p:spTgt spid="3">
+                                            <p:txEl>
+                                              <p:pRg st="4" end="4"/>
+                                            </p:txEl>
+                                          </p:spTgt>
+                                        </p:tgtEl>
+                                        <p:attrNameLst>
+                                          <p:attrName>style.visibility</p:attrName>
+                                        </p:attrNameLst>
+                                      </p:cBhvr>
+                                      <p:to>
+                                        <p:strVal val="visible"/>
+                                      </p:to>
+                                    </p:set>
+                                    <p:animEffect transition="in" filter="fade">
+                                      <p:cBhvr>
+                                        <p:cTn id="35" dur="500"/>
+                                        <p:tgtEl>
+                                          <p:spTgt spid="3">
+                                            <p:txEl>
+                                              <p:pRg st="4" end="4"/>
+                                            </p:txEl>
+                                          </p:spTgt>
+                                        </p:tgtEl>
+                                      </p:cBhvr>
+                                    </p:animEffect>
+                                    <p:anim calcmode="lin" valueType="num">
+                                      <p:cBhvr>
+                                        <p:cTn id="36" dur="500" fill="hold"/>
+                                        <p:tgtEl>
+                                          <p:spTgt spid="3">
+                                            <p:txEl>
+                                              <p:pRg st="4" end="4"/>
+                                            </p:txEl>
+                                          </p:spTgt>
+                                        </p:tgtEl>
+                                        <p:attrNameLst>
+                                          <p:attrName>ppt_x</p:attrName>
+                                        </p:attrNameLst>
+                                      </p:cBhvr>
+                                      <p:tavLst>
+                                        <p:tav tm="0">
+                                          <p:val>
+                                            <p:strVal val="#ppt_x"/>
+                                          </p:val>
+                                        </p:tav>
+                                        <p:tav tm="100000">
+                                          <p:val>
+                                            <p:strVal val="#ppt_x"/>
+                                          </p:val>
+                                        </p:tav>
+                                      </p:tavLst>
+                                    </p:anim>
+                                    <p:anim calcmode="lin" valueType="num">
+                                      <p:cBhvr>
+                                        <p:cTn id="37" dur="500" fill="hold"/>
+                                        <p:tgtEl>
+                                          <p:spTgt spid="3">
+                                            <p:txEl>
+                                              <p:pRg st="4" end="4"/>
+                                            </p:txEl>
+                                          </p:spTgt>
+                                        </p:tgtEl>
+                                        <p:attrNameLst>
+                                          <p:attrName>ppt_y</p:attrName>
+                                        </p:attrNameLst>
+                                      </p:cBhvr>
+                                      <p:tavLst>
+                                        <p:tav tm="0">
+                                          <p:val>
+                                            <p:strVal val="#ppt_y+.1"/>
+                                          </p:val>
+                                        </p:tav>
+                                        <p:tav tm="100000">
+                                          <p:val>
+                                            <p:strVal val="#ppt_y"/>
+                                          </p:val>
+                                        </p:tav>
+                                      </p:tavLst>
+                                    </p:anim>
+                                  </p:childTnLst>
+                                </p:cTn>
+                              </p:par>
+                            </p:childTnLst>
+                          </p:cTn>
+                        </p:par>
+                      </p:childTnLst>
+                    </p:cTn>
+                  </p:par>
+                  <p:par>
+                    <p:cTn id="38" fill="hold">
+                      <p:stCondLst>
+                        <p:cond delay="indefinite"/>
+                      </p:stCondLst>
+                      <p:childTnLst>
+                        <p:par>
+                          <p:cTn id="39" fill="hold">
+                            <p:stCondLst>
+                              <p:cond delay="0"/>
+                            </p:stCondLst>
+                            <p:childTnLst>
+                              <p:par>
+                                <p:cTn id="40" presetID="42" presetClass="entr" presetSubtype="0" fill="hold" grpId="0" nodeType="clickEffect">
+                                  <p:stCondLst>
+                                    <p:cond delay="0"/>
+                                  </p:stCondLst>
+                                  <p:childTnLst>
+                                    <p:set>
+                                      <p:cBhvr>
+                                        <p:cTn id="41" dur="1" fill="hold">
+                                          <p:stCondLst>
+                                            <p:cond delay="0"/>
+                                          </p:stCondLst>
+                                        </p:cTn>
+                                        <p:tgtEl>
+                                          <p:spTgt spid="3">
+                                            <p:txEl>
+                                              <p:pRg st="5" end="5"/>
+                                            </p:txEl>
+                                          </p:spTgt>
+                                        </p:tgtEl>
+                                        <p:attrNameLst>
+                                          <p:attrName>style.visibility</p:attrName>
+                                        </p:attrNameLst>
+                                      </p:cBhvr>
+                                      <p:to>
+                                        <p:strVal val="visible"/>
+                                      </p:to>
+                                    </p:set>
+                                    <p:animEffect transition="in" filter="fade">
+                                      <p:cBhvr>
+                                        <p:cTn id="42" dur="500"/>
+                                        <p:tgtEl>
+                                          <p:spTgt spid="3">
+                                            <p:txEl>
+                                              <p:pRg st="5" end="5"/>
+                                            </p:txEl>
+                                          </p:spTgt>
+                                        </p:tgtEl>
+                                      </p:cBhvr>
+                                    </p:animEffect>
+                                    <p:anim calcmode="lin" valueType="num">
+                                      <p:cBhvr>
+                                        <p:cTn id="43" dur="500" fill="hold"/>
+                                        <p:tgtEl>
+                                          <p:spTgt spid="3">
+                                            <p:txEl>
+                                              <p:pRg st="5" end="5"/>
+                                            </p:txEl>
+                                          </p:spTgt>
+                                        </p:tgtEl>
+                                        <p:attrNameLst>
+                                          <p:attrName>ppt_x</p:attrName>
+                                        </p:attrNameLst>
+                                      </p:cBhvr>
+                                      <p:tavLst>
+                                        <p:tav tm="0">
+                                          <p:val>
+                                            <p:strVal val="#ppt_x"/>
+                                          </p:val>
+                                        </p:tav>
+                                        <p:tav tm="100000">
+                                          <p:val>
+                                            <p:strVal val="#ppt_x"/>
+                                          </p:val>
+                                        </p:tav>
+                                      </p:tavLst>
+                                    </p:anim>
+                                    <p:anim calcmode="lin" valueType="num">
+                                      <p:cBhvr>
+                                        <p:cTn id="44" dur="500" fill="hold"/>
+                                        <p:tgtEl>
+                                          <p:spTgt spid="3">
+                                            <p:txEl>
+                                              <p:pRg st="5" end="5"/>
+                                            </p:txEl>
+                                          </p:spTgt>
+                                        </p:tgtEl>
+                                        <p:attrNameLst>
+                                          <p:attrName>ppt_y</p:attrName>
+                                        </p:attrNameLst>
+                                      </p:cBhvr>
+                                      <p:tavLst>
+                                        <p:tav tm="0">
+                                          <p:val>
+                                            <p:strVal val="#ppt_y+.1"/>
+                                          </p:val>
+                                        </p:tav>
+                                        <p:tav tm="100000">
+                                          <p:val>
+                                            <p:strVal val="#ppt_y"/>
+                                          </p:val>
+                                        </p:tav>
+                                      </p:tavLst>
+                                    </p:anim>
+                                  </p:childTnLst>
+                                </p:cTn>
+                              </p:par>
+                            </p:childTnLst>
+                          </p:cTn>
+                        </p:par>
+                      </p:childTnLst>
+                    </p:cTn>
+                  </p:par>
+                  <p:par>
+                    <p:cTn id="45" fill="hold">
+                      <p:stCondLst>
+                        <p:cond delay="indefinite"/>
+                      </p:stCondLst>
+                      <p:childTnLst>
+                        <p:par>
+                          <p:cTn id="46" fill="hold">
+                            <p:stCondLst>
+                              <p:cond delay="0"/>
+                            </p:stCondLst>
+                            <p:childTnLst>
+                              <p:par>
+                                <p:cTn id="47" presetID="2" presetClass="entr" presetSubtype="4" fill="hold" nodeType="clickEffect">
+                                  <p:stCondLst>
+                                    <p:cond delay="0"/>
+                                  </p:stCondLst>
+                                  <p:childTnLst>
+                                    <p:set>
+                                      <p:cBhvr>
+                                        <p:cTn id="48" dur="1" fill="hold">
+                                          <p:stCondLst>
+                                            <p:cond delay="0"/>
+                                          </p:stCondLst>
+                                        </p:cTn>
+                                        <p:tgtEl>
+                                          <p:spTgt spid="7170"/>
+                                        </p:tgtEl>
+                                        <p:attrNameLst>
+                                          <p:attrName>style.visibility</p:attrName>
+                                        </p:attrNameLst>
+                                      </p:cBhvr>
+                                      <p:to>
+                                        <p:strVal val="visible"/>
+                                      </p:to>
+                                    </p:set>
+                                    <p:anim calcmode="lin" valueType="num">
+                                      <p:cBhvr additive="base">
+                                        <p:cTn id="49" dur="500" fill="hold"/>
+                                        <p:tgtEl>
+                                          <p:spTgt spid="7170"/>
+                                        </p:tgtEl>
+                                        <p:attrNameLst>
+                                          <p:attrName>ppt_x</p:attrName>
+                                        </p:attrNameLst>
+                                      </p:cBhvr>
+                                      <p:tavLst>
+                                        <p:tav tm="0">
+                                          <p:val>
+                                            <p:strVal val="#ppt_x"/>
+                                          </p:val>
+                                        </p:tav>
+                                        <p:tav tm="100000">
+                                          <p:val>
+                                            <p:strVal val="#ppt_x"/>
+                                          </p:val>
+                                        </p:tav>
+                                      </p:tavLst>
+                                    </p:anim>
+                                    <p:anim calcmode="lin" valueType="num">
+                                      <p:cBhvr additive="base">
+                                        <p:cTn id="50" dur="500" fill="hold"/>
+                                        <p:tgtEl>
+                                          <p:spTgt spid="7170"/>
+                                        </p:tgtEl>
+                                        <p:attrNameLst>
+                                          <p:attrName>ppt_y</p:attrName>
+                                        </p:attrNameLst>
+                                      </p:cBhvr>
+                                      <p:tavLst>
+                                        <p:tav tm="0">
+                                          <p:val>
+                                            <p:strVal val="1+#ppt_h/2"/>
+                                          </p:val>
+                                        </p:tav>
+                                        <p:tav tm="100000">
+                                          <p:val>
+                                            <p:strVal val="#ppt_y"/>
+                                          </p:val>
+                                        </p:tav>
+                                      </p:tavLst>
+                                    </p:anim>
+                                  </p:childTnLst>
+                                </p:cTn>
+                              </p:par>
+                            </p:childTnLst>
+                          </p:cTn>
+                        </p:par>
+                      </p:childTnLst>
+                    </p:cTn>
+                  </p:par>
+                </p:childTnLst>
+              </p:cTn>
+              <p:prevCondLst>
+                <p:cond evt="onPrev" delay="0">
+                  <p:tgtEl>
+                    <p:sldTgt/>
+                  </p:tgtEl>
+                </p:cond>
+              </p:prevCondLst>
+              <p:nextCondLst>
+                <p:cond evt="onNext" delay="0">
+                  <p:tgtEl>
+                    <p:sldTgt/>
+                  </p:tgtEl>
+                </p:cond>
+              </p:nextCondLst>
+            </p:seq>
+          </p:childTnLst>
+        </p:cTn>
+      </p:par>
+    </p:tnLst>
+    <p:bldLst>
+      <p:bldP spid="3" grpId="0" uiExpand="1" build="p"/>
+    </p:bldLst>
+  </p:timing>
+</p:sld>
+</file>
+
+<file path=ppt/slides/slide16.xml><?xml version="1.0" encoding="utf-8"?>
+<p:sld xmlns:a="http://schemas.openxmlformats.org/drawingml/2006/main" xmlns:r="http://schemas.openxmlformats.org/officeDocument/2006/relationships" xmlns:p="http://schemas.openxmlformats.org/presentationml/2006/main">
+  <p:cSld>
+    <p:spTree>
+      <p:nvGrpSpPr>
+        <p:cNvPr id="1" name=""/>
+        <p:cNvGrpSpPr/>
+        <p:nvPr/>
+      </p:nvGrpSpPr>
+      <p:grpSpPr>
+        <a:xfrm>
+          <a:off x="0" y="0"/>
+          <a:ext cx="0" cy="0"/>
+          <a:chOff x="0" y="0"/>
+          <a:chExt cx="0" cy="0"/>
+        </a:xfrm>
+      </p:grpSpPr>
+      <p:sp>
+        <p:nvSpPr>
+          <p:cNvPr id="2" name="Text Placeholder 1">
+            <a:extLst>
+              <a:ext uri="{FF2B5EF4-FFF2-40B4-BE49-F238E27FC236}">
+                <a16:creationId xmlns:a16="http://schemas.microsoft.com/office/drawing/2014/main" id="{173CE56B-1F2D-4371-AAB5-66C635D6FB6D}"/>
+              </a:ext>
+            </a:extLst>
+          </p:cNvPr>
+          <p:cNvSpPr>
+            <a:spLocks noGrp="1"/>
+          </p:cNvSpPr>
+          <p:nvPr>
+            <p:ph type="body" sz="quarter" idx="10"/>
+          </p:nvPr>
+        </p:nvSpPr>
+        <p:spPr/>
+        <p:txBody>
+          <a:bodyPr/>
+          <a:lstStyle/>
+          <a:p>
+            <a:r>
+              <a:rPr lang="en-US" dirty="0"/>
+              <a:t>Questions?</a:t>
+            </a:r>
+          </a:p>
+        </p:txBody>
+      </p:sp>
+    </p:spTree>
+    <p:extLst>
+      <p:ext uri="{BB962C8B-B14F-4D97-AF65-F5344CB8AC3E}">
+        <p14:creationId xmlns:p14="http://schemas.microsoft.com/office/powerpoint/2010/main" val="2318062098"/>
+      </p:ext>
+    </p:extLst>
+  </p:cSld>
+  <p:clrMapOvr>
+    <a:masterClrMapping/>
+  </p:clrMapOvr>
+  <p:transition>
+    <p:fade/>
+  </p:transition>
+</p:sld>
+</file>
+
 <file path=ppt/slides/slide2.xml><?xml version="1.0" encoding="utf-8"?>
 <p:sld xmlns:a="http://schemas.openxmlformats.org/drawingml/2006/main" xmlns:r="http://schemas.openxmlformats.org/officeDocument/2006/relationships" xmlns:p="http://schemas.openxmlformats.org/presentationml/2006/main">
   <p:cSld>
@@ -38423,7 +39702,7 @@
           <a:p>
             <a:r>
               <a:rPr lang="en-US" dirty="0"/>
-              <a:t>Python is named after “Monty Python’s Flying Circus”</a:t>
+              <a:t>Python is named after Monty Python</a:t>
             </a:r>
           </a:p>
           <a:p>
@@ -39564,6 +40843,97 @@
   <p:transition spd="med">
     <p:pull/>
   </p:transition>
+  <p:timing>
+    <p:tnLst>
+      <p:par>
+        <p:cTn id="1" dur="indefinite" restart="never" nodeType="tmRoot">
+          <p:childTnLst>
+            <p:seq concurrent="1" nextAc="seek">
+              <p:cTn id="2" dur="indefinite" nodeType="mainSeq">
+                <p:childTnLst>
+                  <p:par>
+                    <p:cTn id="3" fill="hold">
+                      <p:stCondLst>
+                        <p:cond delay="indefinite"/>
+                      </p:stCondLst>
+                      <p:childTnLst>
+                        <p:par>
+                          <p:cTn id="4" fill="hold">
+                            <p:stCondLst>
+                              <p:cond delay="0"/>
+                            </p:stCondLst>
+                            <p:childTnLst>
+                              <p:par>
+                                <p:cTn id="5" presetID="10" presetClass="entr" presetSubtype="0" fill="hold" nodeType="clickEffect">
+                                  <p:stCondLst>
+                                    <p:cond delay="0"/>
+                                  </p:stCondLst>
+                                  <p:childTnLst>
+                                    <p:set>
+                                      <p:cBhvr>
+                                        <p:cTn id="6" dur="1" fill="hold">
+                                          <p:stCondLst>
+                                            <p:cond delay="0"/>
+                                          </p:stCondLst>
+                                        </p:cTn>
+                                        <p:tgtEl>
+                                          <p:spTgt spid="7">
+                                            <p:txEl>
+                                              <p:pRg st="5" end="5"/>
+                                            </p:txEl>
+                                          </p:spTgt>
+                                        </p:tgtEl>
+                                        <p:attrNameLst>
+                                          <p:attrName>style.visibility</p:attrName>
+                                        </p:attrNameLst>
+                                      </p:cBhvr>
+                                      <p:to>
+                                        <p:strVal val="visible"/>
+                                      </p:to>
+                                    </p:set>
+                                    <p:animEffect transition="in" filter="fade">
+                                      <p:cBhvr>
+                                        <p:cTn id="7" dur="500"/>
+                                        <p:tgtEl>
+                                          <p:spTgt spid="7">
+                                            <p:txEl>
+                                              <p:pRg st="5" end="5"/>
+                                            </p:txEl>
+                                          </p:spTgt>
+                                        </p:tgtEl>
+                                      </p:cBhvr>
+                                    </p:animEffect>
+                                  </p:childTnLst>
+                                </p:cTn>
+                              </p:par>
+                            </p:childTnLst>
+                          </p:cTn>
+                        </p:par>
+                      </p:childTnLst>
+                    </p:cTn>
+                  </p:par>
+                </p:childTnLst>
+              </p:cTn>
+              <p:prevCondLst>
+                <p:cond evt="onPrev" delay="0">
+                  <p:tgtEl>
+                    <p:sldTgt/>
+                  </p:tgtEl>
+                </p:cond>
+              </p:prevCondLst>
+              <p:nextCondLst>
+                <p:cond evt="onNext" delay="0">
+                  <p:tgtEl>
+                    <p:sldTgt/>
+                  </p:tgtEl>
+                </p:cond>
+              </p:nextCondLst>
+            </p:seq>
+          </p:childTnLst>
+        </p:cTn>
+      </p:par>
+    </p:tnLst>
+  </p:timing>
 </p:sld>
 </file>
 
@@ -40821,22 +42191,13 @@
               <a:buNone/>
             </a:pPr>
             <a:r>
-              <a:rPr lang="en-US" sz="4800" dirty="0" err="1">
-                <a:solidFill>
-                  <a:srgbClr val="000000"/>
-                </a:solidFill>
-                <a:latin typeface="Consolas" panose="020B0609020204030204" pitchFamily="49" charset="0"/>
-              </a:rPr>
-              <a:t>my_name</a:t>
-            </a:r>
-            <a:r>
               <a:rPr lang="en-US" sz="4800" dirty="0">
                 <a:solidFill>
                   <a:srgbClr val="000000"/>
                 </a:solidFill>
                 <a:latin typeface="Consolas" panose="020B0609020204030204" pitchFamily="49" charset="0"/>
               </a:rPr>
-              <a:t> = </a:t>
+              <a:t>person = </a:t>
             </a:r>
             <a:r>
               <a:rPr lang="en-US" sz="4800" dirty="0">
@@ -40883,25 +42244,7 @@
                 </a:solidFill>
                 <a:latin typeface="Consolas" panose="020B0609020204030204" pitchFamily="49" charset="0"/>
               </a:rPr>
-              <a:t> + </a:t>
-            </a:r>
-            <a:r>
-              <a:rPr lang="en-US" sz="4800" dirty="0" err="1">
-                <a:solidFill>
-                  <a:srgbClr val="000000"/>
-                </a:solidFill>
-                <a:latin typeface="Consolas" panose="020B0609020204030204" pitchFamily="49" charset="0"/>
-              </a:rPr>
-              <a:t>my_name</a:t>
-            </a:r>
-            <a:r>
-              <a:rPr lang="en-US" sz="4800" dirty="0">
-                <a:solidFill>
-                  <a:srgbClr val="000000"/>
-                </a:solidFill>
-                <a:latin typeface="Consolas" panose="020B0609020204030204" pitchFamily="49" charset="0"/>
-              </a:rPr>
-              <a:t>)</a:t>
+              <a:t> + person)</a:t>
             </a:r>
           </a:p>
           <a:p>
@@ -41162,22 +42505,13 @@
               <a:buNone/>
             </a:pPr>
             <a:r>
-              <a:rPr lang="en-US" sz="4800" dirty="0" err="1">
-                <a:solidFill>
-                  <a:srgbClr val="000000"/>
-                </a:solidFill>
-                <a:latin typeface="Consolas" panose="020B0609020204030204" pitchFamily="49" charset="0"/>
-              </a:rPr>
-              <a:t>my_name</a:t>
-            </a:r>
-            <a:r>
               <a:rPr lang="en-US" sz="4800" dirty="0">
                 <a:solidFill>
                   <a:srgbClr val="000000"/>
                 </a:solidFill>
                 <a:latin typeface="Consolas" panose="020B0609020204030204" pitchFamily="49" charset="0"/>
               </a:rPr>
-              <a:t> = </a:t>
+              <a:t>person = </a:t>
             </a:r>
             <a:r>
               <a:rPr lang="en-US" sz="4800" dirty="0">
@@ -41224,25 +42558,7 @@
                 </a:solidFill>
                 <a:latin typeface="Consolas" panose="020B0609020204030204" pitchFamily="49" charset="0"/>
               </a:rPr>
-              <a:t> + </a:t>
-            </a:r>
-            <a:r>
-              <a:rPr lang="en-US" sz="4800" dirty="0" err="1">
-                <a:solidFill>
-                  <a:srgbClr val="000000"/>
-                </a:solidFill>
-                <a:latin typeface="Consolas" panose="020B0609020204030204" pitchFamily="49" charset="0"/>
-              </a:rPr>
-              <a:t>my_name</a:t>
-            </a:r>
-            <a:r>
-              <a:rPr lang="en-US" sz="4800" dirty="0">
-                <a:solidFill>
-                  <a:srgbClr val="000000"/>
-                </a:solidFill>
-                <a:latin typeface="Consolas" panose="020B0609020204030204" pitchFamily="49" charset="0"/>
-              </a:rPr>
-              <a:t>)</a:t>
+              <a:t> + person)</a:t>
             </a:r>
           </a:p>
           <a:p>
@@ -41271,16 +42587,16 @@
             </a:r>
             <a:r>
               <a:rPr lang="en-US" sz="3600" dirty="0"/>
-              <a:t> here is </a:t>
+              <a:t> here is named </a:t>
             </a:r>
             <a:r>
-              <a:rPr lang="en-US" sz="3600" dirty="0" err="1">
+              <a:rPr lang="en-US" sz="3600" dirty="0">
                 <a:solidFill>
                   <a:srgbClr val="000000"/>
                 </a:solidFill>
                 <a:latin typeface="Consolas" panose="020B0609020204030204" pitchFamily="49" charset="0"/>
               </a:rPr>
-              <a:t>my_name</a:t>
+              <a:t>person</a:t>
             </a:r>
             <a:r>
               <a:rPr lang="en-US" sz="3600" dirty="0"/>

</xml_diff>

<commit_message>
Deploy hytechcamps/python to github.com/hytechcamps/python.git:gh-pages
</commit_message>
<xml_diff>
--- a/ProgrammingWithPython.pptx
+++ b/ProgrammingWithPython.pptx
@@ -5,7 +5,7 @@
     <p:sldMasterId id="2147483648" r:id="rId1"/>
   </p:sldMasterIdLst>
   <p:notesMasterIdLst>
-    <p:notesMasterId r:id="rId16"/>
+    <p:notesMasterId r:id="rId18"/>
   </p:notesMasterIdLst>
   <p:sldIdLst>
     <p:sldId id="259" r:id="rId2"/>
@@ -22,6 +22,8 @@
     <p:sldId id="309" r:id="rId13"/>
     <p:sldId id="301" r:id="rId14"/>
     <p:sldId id="302" r:id="rId15"/>
+    <p:sldId id="308" r:id="rId16"/>
+    <p:sldId id="310" r:id="rId17"/>
   </p:sldIdLst>
   <p:sldSz cx="12192000" cy="6858000"/>
   <p:notesSz cx="6858000" cy="9144000"/>
@@ -221,7 +223,7 @@
           <a:p>
             <a:fld id="{19104133-B5B0-4351-8158-4F0E5EB1E2BF}" type="datetimeFigureOut">
               <a:rPr lang="en-US" smtClean="0"/>
-              <a:t>3/30/2021</a:t>
+              <a:t>5/19/2021</a:t>
             </a:fld>
             <a:endParaRPr lang="en-US"/>
           </a:p>
@@ -921,6 +923,157 @@
     <p:extLst>
       <p:ext uri="{BB962C8B-B14F-4D97-AF65-F5344CB8AC3E}">
         <p14:creationId xmlns:p14="http://schemas.microsoft.com/office/powerpoint/2010/main" val="1593956060"/>
+      </p:ext>
+    </p:extLst>
+  </p:cSld>
+  <p:clrMapOvr>
+    <a:masterClrMapping/>
+  </p:clrMapOvr>
+</p:notes>
+</file>
+
+<file path=ppt/notesSlides/notesSlide13.xml><?xml version="1.0" encoding="utf-8"?>
+<p:notes xmlns:a="http://schemas.openxmlformats.org/drawingml/2006/main" xmlns:r="http://schemas.openxmlformats.org/officeDocument/2006/relationships" xmlns:p="http://schemas.openxmlformats.org/presentationml/2006/main">
+  <p:cSld>
+    <p:spTree>
+      <p:nvGrpSpPr>
+        <p:cNvPr id="1" name=""/>
+        <p:cNvGrpSpPr/>
+        <p:nvPr/>
+      </p:nvGrpSpPr>
+      <p:grpSpPr>
+        <a:xfrm>
+          <a:off x="0" y="0"/>
+          <a:ext cx="0" cy="0"/>
+          <a:chOff x="0" y="0"/>
+          <a:chExt cx="0" cy="0"/>
+        </a:xfrm>
+      </p:grpSpPr>
+      <p:sp>
+        <p:nvSpPr>
+          <p:cNvPr id="2" name="Slide Image Placeholder 1"/>
+          <p:cNvSpPr>
+            <a:spLocks noGrp="1" noRot="1" noChangeAspect="1"/>
+          </p:cNvSpPr>
+          <p:nvPr>
+            <p:ph type="sldImg"/>
+          </p:nvPr>
+        </p:nvSpPr>
+        <p:spPr/>
+      </p:sp>
+      <p:sp>
+        <p:nvSpPr>
+          <p:cNvPr id="3" name="Notes Placeholder 2"/>
+          <p:cNvSpPr>
+            <a:spLocks noGrp="1"/>
+          </p:cNvSpPr>
+          <p:nvPr>
+            <p:ph type="body" idx="1"/>
+          </p:nvPr>
+        </p:nvSpPr>
+        <p:spPr/>
+        <p:txBody>
+          <a:bodyPr/>
+          <a:lstStyle/>
+          <a:p>
+            <a:r>
+              <a:rPr lang="en-US" dirty="0">
+                <a:solidFill>
+                  <a:schemeClr val="bg1"/>
+                </a:solidFill>
+              </a:rPr>
+              <a:t>The main point of this slide is to try encourage students. They may feel overwhelmed because this is a lot of information – but they should stick with it and know that they can learn if they put their mind to it!</a:t>
+            </a:r>
+          </a:p>
+        </p:txBody>
+      </p:sp>
+      <p:sp>
+        <p:nvSpPr>
+          <p:cNvPr id="4" name="Slide Number Placeholder 3"/>
+          <p:cNvSpPr>
+            <a:spLocks noGrp="1"/>
+          </p:cNvSpPr>
+          <p:nvPr>
+            <p:ph type="sldNum" sz="quarter" idx="5"/>
+          </p:nvPr>
+        </p:nvSpPr>
+        <p:spPr/>
+        <p:txBody>
+          <a:bodyPr/>
+          <a:lstStyle/>
+          <a:p>
+            <a:pPr marL="0" marR="0" lvl="0" indent="0" algn="r" defTabSz="914400" rtl="0" eaLnBrk="1" fontAlgn="auto" latinLnBrk="0" hangingPunct="1">
+              <a:lnSpc>
+                <a:spcPct val="100000"/>
+              </a:lnSpc>
+              <a:spcBef>
+                <a:spcPts val="0"/>
+              </a:spcBef>
+              <a:spcAft>
+                <a:spcPts val="0"/>
+              </a:spcAft>
+              <a:buClrTx/>
+              <a:buSzTx/>
+              <a:buFontTx/>
+              <a:buNone/>
+              <a:tabLst/>
+              <a:defRPr/>
+            </a:pPr>
+            <a:fld id="{DEC8F7F9-57EC-49CF-9FCD-2B781E4B449F}" type="slidenum">
+              <a:rPr kumimoji="0" lang="en-US" sz="1200" b="0" i="0" u="none" strike="noStrike" kern="1200" cap="none" spc="0" normalizeH="0" baseline="0" noProof="0" smtClean="0">
+                <a:ln>
+                  <a:noFill/>
+                </a:ln>
+                <a:solidFill>
+                  <a:prstClr val="black"/>
+                </a:solidFill>
+                <a:effectLst/>
+                <a:uLnTx/>
+                <a:uFillTx/>
+                <a:latin typeface="Calibri" panose="020F0502020204030204"/>
+                <a:ea typeface="+mn-ea"/>
+                <a:cs typeface="+mn-cs"/>
+              </a:rPr>
+              <a:pPr marL="0" marR="0" lvl="0" indent="0" algn="r" defTabSz="914400" rtl="0" eaLnBrk="1" fontAlgn="auto" latinLnBrk="0" hangingPunct="1">
+                <a:lnSpc>
+                  <a:spcPct val="100000"/>
+                </a:lnSpc>
+                <a:spcBef>
+                  <a:spcPts val="0"/>
+                </a:spcBef>
+                <a:spcAft>
+                  <a:spcPts val="0"/>
+                </a:spcAft>
+                <a:buClrTx/>
+                <a:buSzTx/>
+                <a:buFontTx/>
+                <a:buNone/>
+                <a:tabLst/>
+                <a:defRPr/>
+              </a:pPr>
+              <a:t>15</a:t>
+            </a:fld>
+            <a:endParaRPr kumimoji="0" lang="en-US" sz="1200" b="0" i="0" u="none" strike="noStrike" kern="1200" cap="none" spc="0" normalizeH="0" baseline="0" noProof="0">
+              <a:ln>
+                <a:noFill/>
+              </a:ln>
+              <a:solidFill>
+                <a:prstClr val="black"/>
+              </a:solidFill>
+              <a:effectLst/>
+              <a:uLnTx/>
+              <a:uFillTx/>
+              <a:latin typeface="Calibri" panose="020F0502020204030204"/>
+              <a:ea typeface="+mn-ea"/>
+              <a:cs typeface="+mn-cs"/>
+            </a:endParaRPr>
+          </a:p>
+        </p:txBody>
+      </p:sp>
+    </p:spTree>
+    <p:extLst>
+      <p:ext uri="{BB962C8B-B14F-4D97-AF65-F5344CB8AC3E}">
+        <p14:creationId xmlns:p14="http://schemas.microsoft.com/office/powerpoint/2010/main" val="544019711"/>
       </p:ext>
     </p:extLst>
   </p:cSld>
@@ -1925,7 +2078,7 @@
             <a:fld id="{1C2D31DE-C454-491C-B5C3-F097855E3DF7}" type="datetime4">
               <a:rPr lang="en-US" smtClean="0"/>
               <a:pPr/>
-              <a:t>March 30, 2021</a:t>
+              <a:t>May 19, 2021</a:t>
             </a:fld>
             <a:endParaRPr lang="en-US" dirty="0"/>
           </a:p>
@@ -5317,7 +5470,7 @@
           <a:p>
             <a:fld id="{5958763E-B898-436D-883D-03711491D54A}" type="datetimeFigureOut">
               <a:rPr lang="en-US" smtClean="0"/>
-              <a:t>3/30/2021</a:t>
+              <a:t>5/19/2021</a:t>
             </a:fld>
             <a:endParaRPr lang="en-US"/>
           </a:p>
@@ -5510,7 +5663,7 @@
           <a:p>
             <a:fld id="{5958763E-B898-436D-883D-03711491D54A}" type="datetimeFigureOut">
               <a:rPr lang="en-US" smtClean="0"/>
-              <a:t>3/30/2021</a:t>
+              <a:t>5/19/2021</a:t>
             </a:fld>
             <a:endParaRPr lang="en-US"/>
           </a:p>
@@ -5760,7 +5913,7 @@
           <a:p>
             <a:fld id="{5958763E-B898-436D-883D-03711491D54A}" type="datetimeFigureOut">
               <a:rPr lang="en-US" smtClean="0"/>
-              <a:t>3/30/2021</a:t>
+              <a:t>5/19/2021</a:t>
             </a:fld>
             <a:endParaRPr lang="en-US"/>
           </a:p>
@@ -6108,7 +6261,7 @@
           <a:p>
             <a:fld id="{5958763E-B898-436D-883D-03711491D54A}" type="datetimeFigureOut">
               <a:rPr lang="en-US" smtClean="0"/>
-              <a:t>3/30/2021</a:t>
+              <a:t>5/19/2021</a:t>
             </a:fld>
             <a:endParaRPr lang="en-US"/>
           </a:p>
@@ -6524,7 +6677,7 @@
           <a:p>
             <a:fld id="{5958763E-B898-436D-883D-03711491D54A}" type="datetimeFigureOut">
               <a:rPr lang="en-US" smtClean="0"/>
-              <a:t>3/30/2021</a:t>
+              <a:t>5/19/2021</a:t>
             </a:fld>
             <a:endParaRPr lang="en-US"/>
           </a:p>
@@ -7025,7 +7178,7 @@
           <a:p>
             <a:fld id="{5958763E-B898-436D-883D-03711491D54A}" type="datetimeFigureOut">
               <a:rPr lang="en-US" smtClean="0"/>
-              <a:t>3/30/2021</a:t>
+              <a:t>5/19/2021</a:t>
             </a:fld>
             <a:endParaRPr lang="en-US"/>
           </a:p>
@@ -7476,7 +7629,7 @@
           <a:p>
             <a:fld id="{5958763E-B898-436D-883D-03711491D54A}" type="datetimeFigureOut">
               <a:rPr lang="en-US" smtClean="0"/>
-              <a:t>3/30/2021</a:t>
+              <a:t>5/19/2021</a:t>
             </a:fld>
             <a:endParaRPr lang="en-US"/>
           </a:p>
@@ -8087,7 +8240,7 @@
           <a:p>
             <a:fld id="{5958763E-B898-436D-883D-03711491D54A}" type="datetimeFigureOut">
               <a:rPr lang="en-US" smtClean="0"/>
-              <a:t>3/30/2021</a:t>
+              <a:t>5/19/2021</a:t>
             </a:fld>
             <a:endParaRPr lang="en-US"/>
           </a:p>
@@ -8858,7 +9011,7 @@
           <a:p>
             <a:fld id="{5958763E-B898-436D-883D-03711491D54A}" type="datetimeFigureOut">
               <a:rPr lang="en-US" smtClean="0"/>
-              <a:t>3/30/2021</a:t>
+              <a:t>5/19/2021</a:t>
             </a:fld>
             <a:endParaRPr lang="en-US"/>
           </a:p>
@@ -8962,7 +9115,7 @@
           <a:p>
             <a:fld id="{5958763E-B898-436D-883D-03711491D54A}" type="datetimeFigureOut">
               <a:rPr lang="en-US" smtClean="0"/>
-              <a:t>3/30/2021</a:t>
+              <a:t>5/19/2021</a:t>
             </a:fld>
             <a:endParaRPr lang="en-US"/>
           </a:p>
@@ -9289,7 +9442,7 @@
             <a:fld id="{1C2D31DE-C454-491C-B5C3-F097855E3DF7}" type="datetime4">
               <a:rPr lang="en-US" smtClean="0"/>
               <a:pPr/>
-              <a:t>March 30, 2021</a:t>
+              <a:t>May 19, 2021</a:t>
             </a:fld>
             <a:endParaRPr lang="en-US" dirty="0"/>
           </a:p>
@@ -12441,7 +12594,7 @@
           <a:p>
             <a:fld id="{5958763E-B898-436D-883D-03711491D54A}" type="datetimeFigureOut">
               <a:rPr lang="en-US" smtClean="0"/>
-              <a:t>3/30/2021</a:t>
+              <a:t>5/19/2021</a:t>
             </a:fld>
             <a:endParaRPr lang="en-US"/>
           </a:p>
@@ -12565,7 +12718,7 @@
           <a:p>
             <a:fld id="{5958763E-B898-436D-883D-03711491D54A}" type="datetimeFigureOut">
               <a:rPr lang="en-US" smtClean="0"/>
-              <a:t>3/30/2021</a:t>
+              <a:t>5/19/2021</a:t>
             </a:fld>
             <a:endParaRPr lang="en-US"/>
           </a:p>
@@ -12689,7 +12842,7 @@
           <a:p>
             <a:fld id="{5958763E-B898-436D-883D-03711491D54A}" type="datetimeFigureOut">
               <a:rPr lang="en-US" smtClean="0"/>
-              <a:t>3/30/2021</a:t>
+              <a:t>5/19/2021</a:t>
             </a:fld>
             <a:endParaRPr lang="en-US"/>
           </a:p>
@@ -12813,7 +12966,7 @@
           <a:p>
             <a:fld id="{5958763E-B898-436D-883D-03711491D54A}" type="datetimeFigureOut">
               <a:rPr lang="en-US" smtClean="0"/>
-              <a:t>3/30/2021</a:t>
+              <a:t>5/19/2021</a:t>
             </a:fld>
             <a:endParaRPr lang="en-US"/>
           </a:p>
@@ -12937,7 +13090,7 @@
           <a:p>
             <a:fld id="{5958763E-B898-436D-883D-03711491D54A}" type="datetimeFigureOut">
               <a:rPr lang="en-US" smtClean="0"/>
-              <a:t>3/30/2021</a:t>
+              <a:t>5/19/2021</a:t>
             </a:fld>
             <a:endParaRPr lang="en-US"/>
           </a:p>
@@ -13061,7 +13214,7 @@
           <a:p>
             <a:fld id="{5958763E-B898-436D-883D-03711491D54A}" type="datetimeFigureOut">
               <a:rPr lang="en-US" smtClean="0"/>
-              <a:t>3/30/2021</a:t>
+              <a:t>5/19/2021</a:t>
             </a:fld>
             <a:endParaRPr lang="en-US"/>
           </a:p>
@@ -13185,7 +13338,7 @@
           <a:p>
             <a:fld id="{5958763E-B898-436D-883D-03711491D54A}" type="datetimeFigureOut">
               <a:rPr lang="en-US" smtClean="0"/>
-              <a:t>3/30/2021</a:t>
+              <a:t>5/19/2021</a:t>
             </a:fld>
             <a:endParaRPr lang="en-US"/>
           </a:p>
@@ -13309,7 +13462,7 @@
           <a:p>
             <a:fld id="{5958763E-B898-436D-883D-03711491D54A}" type="datetimeFigureOut">
               <a:rPr lang="en-US" smtClean="0"/>
-              <a:t>3/30/2021</a:t>
+              <a:t>5/19/2021</a:t>
             </a:fld>
             <a:endParaRPr lang="en-US"/>
           </a:p>
@@ -13442,7 +13595,7 @@
           <a:p>
             <a:fld id="{5958763E-B898-436D-883D-03711491D54A}" type="datetimeFigureOut">
               <a:rPr lang="en-US" smtClean="0"/>
-              <a:t>3/30/2021</a:t>
+              <a:t>5/19/2021</a:t>
             </a:fld>
             <a:endParaRPr lang="en-US"/>
           </a:p>
@@ -16781,7 +16934,7 @@
             <a:fld id="{1C2D31DE-C454-491C-B5C3-F097855E3DF7}" type="datetime4">
               <a:rPr lang="en-US" smtClean="0"/>
               <a:pPr/>
-              <a:t>March 30, 2021</a:t>
+              <a:t>May 19, 2021</a:t>
             </a:fld>
             <a:endParaRPr lang="en-US" dirty="0"/>
           </a:p>
@@ -29017,7 +29170,7 @@
           <a:p>
             <a:fld id="{5958763E-B898-436D-883D-03711491D54A}" type="datetimeFigureOut">
               <a:rPr lang="en-US" smtClean="0"/>
-              <a:t>3/30/2021</a:t>
+              <a:t>5/19/2021</a:t>
             </a:fld>
             <a:endParaRPr lang="en-US"/>
           </a:p>
@@ -29419,7 +29572,7 @@
           <a:p>
             <a:fld id="{5958763E-B898-436D-883D-03711491D54A}" type="datetimeFigureOut">
               <a:rPr lang="en-US" smtClean="0"/>
-              <a:t>3/30/2021</a:t>
+              <a:t>5/19/2021</a:t>
             </a:fld>
             <a:endParaRPr lang="en-US"/>
           </a:p>
@@ -29713,7 +29866,7 @@
           <a:p>
             <a:fld id="{5958763E-B898-436D-883D-03711491D54A}" type="datetimeFigureOut">
               <a:rPr lang="en-US" smtClean="0"/>
-              <a:t>3/30/2021</a:t>
+              <a:t>5/19/2021</a:t>
             </a:fld>
             <a:endParaRPr lang="en-US"/>
           </a:p>
@@ -29914,7 +30067,7 @@
           <a:p>
             <a:fld id="{5958763E-B898-436D-883D-03711491D54A}" type="datetimeFigureOut">
               <a:rPr lang="en-US" smtClean="0"/>
-              <a:t>3/30/2021</a:t>
+              <a:t>5/19/2021</a:t>
             </a:fld>
             <a:endParaRPr lang="en-US"/>
           </a:p>
@@ -30175,7 +30328,7 @@
           <a:p>
             <a:fld id="{5958763E-B898-436D-883D-03711491D54A}" type="datetimeFigureOut">
               <a:rPr lang="en-US" smtClean="0"/>
-              <a:t>3/30/2021</a:t>
+              <a:t>5/19/2021</a:t>
             </a:fld>
             <a:endParaRPr lang="en-US"/>
           </a:p>
@@ -30683,7 +30836,7 @@
           <a:p>
             <a:fld id="{5958763E-B898-436D-883D-03711491D54A}" type="datetimeFigureOut">
               <a:rPr lang="en-US" smtClean="0"/>
-              <a:t>3/30/2021</a:t>
+              <a:t>5/19/2021</a:t>
             </a:fld>
             <a:endParaRPr lang="en-US"/>
           </a:p>
@@ -31162,7 +31315,7 @@
           <a:p>
             <a:fld id="{5958763E-B898-436D-883D-03711491D54A}" type="datetimeFigureOut">
               <a:rPr lang="en-US" smtClean="0"/>
-              <a:t>3/30/2021</a:t>
+              <a:t>5/19/2021</a:t>
             </a:fld>
             <a:endParaRPr lang="en-US"/>
           </a:p>
@@ -31981,7 +32134,7 @@
           <a:p>
             <a:fld id="{5958763E-B898-436D-883D-03711491D54A}" type="datetimeFigureOut">
               <a:rPr lang="en-US" smtClean="0"/>
-              <a:t>3/30/2021</a:t>
+              <a:t>5/19/2021</a:t>
             </a:fld>
             <a:endParaRPr lang="en-US"/>
           </a:p>
@@ -32182,7 +32335,7 @@
           <a:p>
             <a:fld id="{5958763E-B898-436D-883D-03711491D54A}" type="datetimeFigureOut">
               <a:rPr lang="en-US" smtClean="0"/>
-              <a:t>3/30/2021</a:t>
+              <a:t>5/19/2021</a:t>
             </a:fld>
             <a:endParaRPr lang="en-US"/>
           </a:p>
@@ -32517,7 +32670,7 @@
           <a:p>
             <a:fld id="{5958763E-B898-436D-883D-03711491D54A}" type="datetimeFigureOut">
               <a:rPr lang="en-US" smtClean="0"/>
-              <a:t>3/30/2021</a:t>
+              <a:t>5/19/2021</a:t>
             </a:fld>
             <a:endParaRPr lang="en-US"/>
           </a:p>
@@ -32747,7 +32900,7 @@
           <a:p>
             <a:fld id="{5958763E-B898-436D-883D-03711491D54A}" type="datetimeFigureOut">
               <a:rPr lang="en-US" smtClean="0"/>
-              <a:t>3/30/2021</a:t>
+              <a:t>5/19/2021</a:t>
             </a:fld>
             <a:endParaRPr lang="en-US"/>
           </a:p>
@@ -32991,7 +33144,7 @@
           <a:p>
             <a:fld id="{5958763E-B898-436D-883D-03711491D54A}" type="datetimeFigureOut">
               <a:rPr lang="en-US" smtClean="0"/>
-              <a:t>3/30/2021</a:t>
+              <a:t>5/19/2021</a:t>
             </a:fld>
             <a:endParaRPr lang="en-US"/>
           </a:p>
@@ -36621,7 +36774,7 @@
           <a:p>
             <a:r>
               <a:rPr lang="en-US" dirty="0"/>
-              <a:t>This way, instead of writing 500 lines of code, only one line has to change</a:t>
+              <a:t>This way, instead of writing 500 lines of code, the same can be accomplished in just a few lines</a:t>
             </a:r>
           </a:p>
           <a:p>
@@ -38355,6 +38508,1132 @@
 </p:sld>
 </file>
 
+<file path=ppt/slides/slide15.xml><?xml version="1.0" encoding="utf-8"?>
+<p:sld xmlns:a="http://schemas.openxmlformats.org/drawingml/2006/main" xmlns:r="http://schemas.openxmlformats.org/officeDocument/2006/relationships" xmlns:p="http://schemas.openxmlformats.org/presentationml/2006/main">
+  <p:cSld>
+    <p:bg>
+      <p:bgPr>
+        <a:solidFill>
+          <a:schemeClr val="tx1">
+            <a:lumMod val="50000"/>
+          </a:schemeClr>
+        </a:solidFill>
+        <a:effectLst/>
+      </p:bgPr>
+    </p:bg>
+    <p:spTree>
+      <p:nvGrpSpPr>
+        <p:cNvPr id="1" name=""/>
+        <p:cNvGrpSpPr/>
+        <p:nvPr/>
+      </p:nvGrpSpPr>
+      <p:grpSpPr>
+        <a:xfrm>
+          <a:off x="0" y="0"/>
+          <a:ext cx="0" cy="0"/>
+          <a:chOff x="0" y="0"/>
+          <a:chExt cx="0" cy="0"/>
+        </a:xfrm>
+      </p:grpSpPr>
+      <p:sp>
+        <p:nvSpPr>
+          <p:cNvPr id="2" name="Title 1">
+            <a:extLst>
+              <a:ext uri="{FF2B5EF4-FFF2-40B4-BE49-F238E27FC236}">
+                <a16:creationId xmlns:a16="http://schemas.microsoft.com/office/drawing/2014/main" id="{3D9929B0-6B50-4382-AFD5-85CAF95884E2}"/>
+              </a:ext>
+            </a:extLst>
+          </p:cNvPr>
+          <p:cNvSpPr>
+            <a:spLocks noGrp="1"/>
+          </p:cNvSpPr>
+          <p:nvPr>
+            <p:ph type="title"/>
+          </p:nvPr>
+        </p:nvSpPr>
+        <p:spPr/>
+        <p:txBody>
+          <a:bodyPr/>
+          <a:lstStyle/>
+          <a:p>
+            <a:r>
+              <a:rPr lang="en-US" dirty="0">
+                <a:solidFill>
+                  <a:schemeClr val="tx1">
+                    <a:lumMod val="50000"/>
+                  </a:schemeClr>
+                </a:solidFill>
+              </a:rPr>
+              <a:t>Summary and Closing Remarks</a:t>
+            </a:r>
+          </a:p>
+        </p:txBody>
+      </p:sp>
+      <p:sp>
+        <p:nvSpPr>
+          <p:cNvPr id="3" name="Content Placeholder 2">
+            <a:extLst>
+              <a:ext uri="{FF2B5EF4-FFF2-40B4-BE49-F238E27FC236}">
+                <a16:creationId xmlns:a16="http://schemas.microsoft.com/office/drawing/2014/main" id="{FC6E5353-C281-457A-BDA8-C92D327FAA8B}"/>
+              </a:ext>
+            </a:extLst>
+          </p:cNvPr>
+          <p:cNvSpPr>
+            <a:spLocks noGrp="1"/>
+          </p:cNvSpPr>
+          <p:nvPr>
+            <p:ph idx="1"/>
+          </p:nvPr>
+        </p:nvSpPr>
+        <p:spPr>
+          <a:xfrm>
+            <a:off x="381000" y="1143000"/>
+            <a:ext cx="11430000" cy="3771900"/>
+          </a:xfrm>
+        </p:spPr>
+        <p:txBody>
+          <a:bodyPr anchor="ctr">
+            <a:normAutofit/>
+          </a:bodyPr>
+          <a:lstStyle/>
+          <a:p>
+            <a:r>
+              <a:rPr lang="en-US" sz="3200" b="1" dirty="0">
+                <a:solidFill>
+                  <a:schemeClr val="bg1"/>
+                </a:solidFill>
+              </a:rPr>
+              <a:t>Python</a:t>
+            </a:r>
+            <a:r>
+              <a:rPr lang="en-US" sz="3200" dirty="0">
+                <a:solidFill>
+                  <a:schemeClr val="bg1"/>
+                </a:solidFill>
+              </a:rPr>
+              <a:t> can be used to make lots of different things</a:t>
+            </a:r>
+          </a:p>
+          <a:p>
+            <a:r>
+              <a:rPr lang="en-US" sz="3200" b="1" dirty="0">
+                <a:solidFill>
+                  <a:schemeClr val="bg1"/>
+                </a:solidFill>
+              </a:rPr>
+              <a:t>Static string text values </a:t>
+            </a:r>
+            <a:r>
+              <a:rPr lang="en-US" sz="3200" dirty="0">
+                <a:solidFill>
+                  <a:schemeClr val="bg1"/>
+                </a:solidFill>
+              </a:rPr>
+              <a:t>go between quotes</a:t>
+            </a:r>
+          </a:p>
+          <a:p>
+            <a:r>
+              <a:rPr lang="en-US" sz="3200" b="1" dirty="0">
+                <a:solidFill>
+                  <a:schemeClr val="bg1"/>
+                </a:solidFill>
+              </a:rPr>
+              <a:t>Variables</a:t>
+            </a:r>
+            <a:r>
+              <a:rPr lang="en-US" sz="3200" dirty="0">
+                <a:solidFill>
+                  <a:schemeClr val="bg1"/>
+                </a:solidFill>
+              </a:rPr>
+              <a:t> are containers for data or objects</a:t>
+            </a:r>
+          </a:p>
+          <a:p>
+            <a:r>
+              <a:rPr lang="en-US" sz="3200" b="1" dirty="0">
+                <a:solidFill>
+                  <a:schemeClr val="bg1"/>
+                </a:solidFill>
+              </a:rPr>
+              <a:t>Loops</a:t>
+            </a:r>
+            <a:r>
+              <a:rPr lang="en-US" sz="3200" dirty="0">
+                <a:solidFill>
+                  <a:schemeClr val="bg1"/>
+                </a:solidFill>
+              </a:rPr>
+              <a:t> will repeat certain lines of code multiple times</a:t>
+            </a:r>
+          </a:p>
+          <a:p>
+            <a:r>
+              <a:rPr lang="en-US" sz="3200" dirty="0">
+                <a:solidFill>
+                  <a:schemeClr val="bg1"/>
+                </a:solidFill>
+              </a:rPr>
+              <a:t>This programming can feel intimidating – but </a:t>
+            </a:r>
+            <a:r>
+              <a:rPr lang="en-US" sz="3200" b="1" dirty="0">
+                <a:solidFill>
+                  <a:schemeClr val="bg1"/>
+                </a:solidFill>
+              </a:rPr>
+              <a:t>don’t worry</a:t>
+            </a:r>
+          </a:p>
+          <a:p>
+            <a:r>
+              <a:rPr lang="en-US" sz="3200" b="1" dirty="0">
+                <a:solidFill>
+                  <a:schemeClr val="bg1"/>
+                </a:solidFill>
+              </a:rPr>
+              <a:t>You can do it!</a:t>
+            </a:r>
+          </a:p>
+        </p:txBody>
+      </p:sp>
+      <p:pic>
+        <p:nvPicPr>
+          <p:cNvPr id="7170" name="Picture 2" descr="Supportive snake | Kirishima eijirou, Story inspiration, Arcanum">
+            <a:extLst>
+              <a:ext uri="{FF2B5EF4-FFF2-40B4-BE49-F238E27FC236}">
+                <a16:creationId xmlns:a16="http://schemas.microsoft.com/office/drawing/2014/main" id="{5F300B28-0ABC-4B90-BC93-FAD74B7BFD6F}"/>
+              </a:ext>
+            </a:extLst>
+          </p:cNvPr>
+          <p:cNvPicPr>
+            <a:picLocks noChangeAspect="1" noChangeArrowheads="1"/>
+          </p:cNvPicPr>
+          <p:nvPr/>
+        </p:nvPicPr>
+        <p:blipFill rotWithShape="1">
+          <a:blip r:embed="rId3">
+            <a:extLst>
+              <a:ext uri="{28A0092B-C50C-407E-A947-70E740481C1C}">
+                <a14:useLocalDpi xmlns:a14="http://schemas.microsoft.com/office/drawing/2010/main" val="0"/>
+              </a:ext>
+            </a:extLst>
+          </a:blip>
+          <a:srcRect t="23333" b="18334"/>
+          <a:stretch/>
+        </p:blipFill>
+        <p:spPr bwMode="auto">
+          <a:xfrm>
+            <a:off x="3924300" y="4338328"/>
+            <a:ext cx="7104062" cy="2753343"/>
+          </a:xfrm>
+          <a:prstGeom prst="rect">
+            <a:avLst/>
+          </a:prstGeom>
+          <a:noFill/>
+          <a:extLst>
+            <a:ext uri="{909E8E84-426E-40DD-AFC4-6F175D3DCCD1}">
+              <a14:hiddenFill xmlns:a14="http://schemas.microsoft.com/office/drawing/2010/main">
+                <a:solidFill>
+                  <a:srgbClr val="FFFFFF"/>
+                </a:solidFill>
+              </a14:hiddenFill>
+            </a:ext>
+          </a:extLst>
+        </p:spPr>
+      </p:pic>
+    </p:spTree>
+    <p:extLst>
+      <p:ext uri="{BB962C8B-B14F-4D97-AF65-F5344CB8AC3E}">
+        <p14:creationId xmlns:p14="http://schemas.microsoft.com/office/powerpoint/2010/main" val="495570243"/>
+      </p:ext>
+    </p:extLst>
+  </p:cSld>
+  <p:clrMapOvr>
+    <a:masterClrMapping/>
+  </p:clrMapOvr>
+  <p:transition>
+    <p:fade/>
+  </p:transition>
+  <p:timing>
+    <p:tnLst>
+      <p:par>
+        <p:cTn id="1" dur="indefinite" restart="never" nodeType="tmRoot">
+          <p:childTnLst>
+            <p:seq concurrent="1" nextAc="seek">
+              <p:cTn id="2" dur="indefinite" nodeType="mainSeq">
+                <p:childTnLst>
+                  <p:par>
+                    <p:cTn id="3" fill="hold">
+                      <p:stCondLst>
+                        <p:cond delay="indefinite"/>
+                      </p:stCondLst>
+                      <p:childTnLst>
+                        <p:par>
+                          <p:cTn id="4" fill="hold">
+                            <p:stCondLst>
+                              <p:cond delay="0"/>
+                            </p:stCondLst>
+                            <p:childTnLst>
+                              <p:par>
+                                <p:cTn id="5" presetID="42" presetClass="entr" presetSubtype="0" fill="hold" grpId="0" nodeType="clickEffect">
+                                  <p:stCondLst>
+                                    <p:cond delay="0"/>
+                                  </p:stCondLst>
+                                  <p:childTnLst>
+                                    <p:set>
+                                      <p:cBhvr>
+                                        <p:cTn id="6" dur="1" fill="hold">
+                                          <p:stCondLst>
+                                            <p:cond delay="0"/>
+                                          </p:stCondLst>
+                                        </p:cTn>
+                                        <p:tgtEl>
+                                          <p:spTgt spid="3">
+                                            <p:txEl>
+                                              <p:pRg st="0" end="0"/>
+                                            </p:txEl>
+                                          </p:spTgt>
+                                        </p:tgtEl>
+                                        <p:attrNameLst>
+                                          <p:attrName>style.visibility</p:attrName>
+                                        </p:attrNameLst>
+                                      </p:cBhvr>
+                                      <p:to>
+                                        <p:strVal val="visible"/>
+                                      </p:to>
+                                    </p:set>
+                                    <p:animEffect transition="in" filter="fade">
+                                      <p:cBhvr>
+                                        <p:cTn id="7" dur="500"/>
+                                        <p:tgtEl>
+                                          <p:spTgt spid="3">
+                                            <p:txEl>
+                                              <p:pRg st="0" end="0"/>
+                                            </p:txEl>
+                                          </p:spTgt>
+                                        </p:tgtEl>
+                                      </p:cBhvr>
+                                    </p:animEffect>
+                                    <p:anim calcmode="lin" valueType="num">
+                                      <p:cBhvr>
+                                        <p:cTn id="8" dur="500" fill="hold"/>
+                                        <p:tgtEl>
+                                          <p:spTgt spid="3">
+                                            <p:txEl>
+                                              <p:pRg st="0" end="0"/>
+                                            </p:txEl>
+                                          </p:spTgt>
+                                        </p:tgtEl>
+                                        <p:attrNameLst>
+                                          <p:attrName>ppt_x</p:attrName>
+                                        </p:attrNameLst>
+                                      </p:cBhvr>
+                                      <p:tavLst>
+                                        <p:tav tm="0">
+                                          <p:val>
+                                            <p:strVal val="#ppt_x"/>
+                                          </p:val>
+                                        </p:tav>
+                                        <p:tav tm="100000">
+                                          <p:val>
+                                            <p:strVal val="#ppt_x"/>
+                                          </p:val>
+                                        </p:tav>
+                                      </p:tavLst>
+                                    </p:anim>
+                                    <p:anim calcmode="lin" valueType="num">
+                                      <p:cBhvr>
+                                        <p:cTn id="9" dur="500" fill="hold"/>
+                                        <p:tgtEl>
+                                          <p:spTgt spid="3">
+                                            <p:txEl>
+                                              <p:pRg st="0" end="0"/>
+                                            </p:txEl>
+                                          </p:spTgt>
+                                        </p:tgtEl>
+                                        <p:attrNameLst>
+                                          <p:attrName>ppt_y</p:attrName>
+                                        </p:attrNameLst>
+                                      </p:cBhvr>
+                                      <p:tavLst>
+                                        <p:tav tm="0">
+                                          <p:val>
+                                            <p:strVal val="#ppt_y+.1"/>
+                                          </p:val>
+                                        </p:tav>
+                                        <p:tav tm="100000">
+                                          <p:val>
+                                            <p:strVal val="#ppt_y"/>
+                                          </p:val>
+                                        </p:tav>
+                                      </p:tavLst>
+                                    </p:anim>
+                                  </p:childTnLst>
+                                </p:cTn>
+                              </p:par>
+                            </p:childTnLst>
+                          </p:cTn>
+                        </p:par>
+                      </p:childTnLst>
+                    </p:cTn>
+                  </p:par>
+                  <p:par>
+                    <p:cTn id="10" fill="hold">
+                      <p:stCondLst>
+                        <p:cond delay="indefinite"/>
+                      </p:stCondLst>
+                      <p:childTnLst>
+                        <p:par>
+                          <p:cTn id="11" fill="hold">
+                            <p:stCondLst>
+                              <p:cond delay="0"/>
+                            </p:stCondLst>
+                            <p:childTnLst>
+                              <p:par>
+                                <p:cTn id="12" presetID="42" presetClass="entr" presetSubtype="0" fill="hold" grpId="0" nodeType="clickEffect">
+                                  <p:stCondLst>
+                                    <p:cond delay="0"/>
+                                  </p:stCondLst>
+                                  <p:childTnLst>
+                                    <p:set>
+                                      <p:cBhvr>
+                                        <p:cTn id="13" dur="1" fill="hold">
+                                          <p:stCondLst>
+                                            <p:cond delay="0"/>
+                                          </p:stCondLst>
+                                        </p:cTn>
+                                        <p:tgtEl>
+                                          <p:spTgt spid="3">
+                                            <p:txEl>
+                                              <p:pRg st="1" end="1"/>
+                                            </p:txEl>
+                                          </p:spTgt>
+                                        </p:tgtEl>
+                                        <p:attrNameLst>
+                                          <p:attrName>style.visibility</p:attrName>
+                                        </p:attrNameLst>
+                                      </p:cBhvr>
+                                      <p:to>
+                                        <p:strVal val="visible"/>
+                                      </p:to>
+                                    </p:set>
+                                    <p:animEffect transition="in" filter="fade">
+                                      <p:cBhvr>
+                                        <p:cTn id="14" dur="500"/>
+                                        <p:tgtEl>
+                                          <p:spTgt spid="3">
+                                            <p:txEl>
+                                              <p:pRg st="1" end="1"/>
+                                            </p:txEl>
+                                          </p:spTgt>
+                                        </p:tgtEl>
+                                      </p:cBhvr>
+                                    </p:animEffect>
+                                    <p:anim calcmode="lin" valueType="num">
+                                      <p:cBhvr>
+                                        <p:cTn id="15" dur="500" fill="hold"/>
+                                        <p:tgtEl>
+                                          <p:spTgt spid="3">
+                                            <p:txEl>
+                                              <p:pRg st="1" end="1"/>
+                                            </p:txEl>
+                                          </p:spTgt>
+                                        </p:tgtEl>
+                                        <p:attrNameLst>
+                                          <p:attrName>ppt_x</p:attrName>
+                                        </p:attrNameLst>
+                                      </p:cBhvr>
+                                      <p:tavLst>
+                                        <p:tav tm="0">
+                                          <p:val>
+                                            <p:strVal val="#ppt_x"/>
+                                          </p:val>
+                                        </p:tav>
+                                        <p:tav tm="100000">
+                                          <p:val>
+                                            <p:strVal val="#ppt_x"/>
+                                          </p:val>
+                                        </p:tav>
+                                      </p:tavLst>
+                                    </p:anim>
+                                    <p:anim calcmode="lin" valueType="num">
+                                      <p:cBhvr>
+                                        <p:cTn id="16" dur="500" fill="hold"/>
+                                        <p:tgtEl>
+                                          <p:spTgt spid="3">
+                                            <p:txEl>
+                                              <p:pRg st="1" end="1"/>
+                                            </p:txEl>
+                                          </p:spTgt>
+                                        </p:tgtEl>
+                                        <p:attrNameLst>
+                                          <p:attrName>ppt_y</p:attrName>
+                                        </p:attrNameLst>
+                                      </p:cBhvr>
+                                      <p:tavLst>
+                                        <p:tav tm="0">
+                                          <p:val>
+                                            <p:strVal val="#ppt_y+.1"/>
+                                          </p:val>
+                                        </p:tav>
+                                        <p:tav tm="100000">
+                                          <p:val>
+                                            <p:strVal val="#ppt_y"/>
+                                          </p:val>
+                                        </p:tav>
+                                      </p:tavLst>
+                                    </p:anim>
+                                  </p:childTnLst>
+                                </p:cTn>
+                              </p:par>
+                            </p:childTnLst>
+                          </p:cTn>
+                        </p:par>
+                      </p:childTnLst>
+                    </p:cTn>
+                  </p:par>
+                  <p:par>
+                    <p:cTn id="17" fill="hold">
+                      <p:stCondLst>
+                        <p:cond delay="indefinite"/>
+                      </p:stCondLst>
+                      <p:childTnLst>
+                        <p:par>
+                          <p:cTn id="18" fill="hold">
+                            <p:stCondLst>
+                              <p:cond delay="0"/>
+                            </p:stCondLst>
+                            <p:childTnLst>
+                              <p:par>
+                                <p:cTn id="19" presetID="42" presetClass="entr" presetSubtype="0" fill="hold" grpId="0" nodeType="clickEffect">
+                                  <p:stCondLst>
+                                    <p:cond delay="0"/>
+                                  </p:stCondLst>
+                                  <p:childTnLst>
+                                    <p:set>
+                                      <p:cBhvr>
+                                        <p:cTn id="20" dur="1" fill="hold">
+                                          <p:stCondLst>
+                                            <p:cond delay="0"/>
+                                          </p:stCondLst>
+                                        </p:cTn>
+                                        <p:tgtEl>
+                                          <p:spTgt spid="3">
+                                            <p:txEl>
+                                              <p:pRg st="2" end="2"/>
+                                            </p:txEl>
+                                          </p:spTgt>
+                                        </p:tgtEl>
+                                        <p:attrNameLst>
+                                          <p:attrName>style.visibility</p:attrName>
+                                        </p:attrNameLst>
+                                      </p:cBhvr>
+                                      <p:to>
+                                        <p:strVal val="visible"/>
+                                      </p:to>
+                                    </p:set>
+                                    <p:animEffect transition="in" filter="fade">
+                                      <p:cBhvr>
+                                        <p:cTn id="21" dur="500"/>
+                                        <p:tgtEl>
+                                          <p:spTgt spid="3">
+                                            <p:txEl>
+                                              <p:pRg st="2" end="2"/>
+                                            </p:txEl>
+                                          </p:spTgt>
+                                        </p:tgtEl>
+                                      </p:cBhvr>
+                                    </p:animEffect>
+                                    <p:anim calcmode="lin" valueType="num">
+                                      <p:cBhvr>
+                                        <p:cTn id="22" dur="500" fill="hold"/>
+                                        <p:tgtEl>
+                                          <p:spTgt spid="3">
+                                            <p:txEl>
+                                              <p:pRg st="2" end="2"/>
+                                            </p:txEl>
+                                          </p:spTgt>
+                                        </p:tgtEl>
+                                        <p:attrNameLst>
+                                          <p:attrName>ppt_x</p:attrName>
+                                        </p:attrNameLst>
+                                      </p:cBhvr>
+                                      <p:tavLst>
+                                        <p:tav tm="0">
+                                          <p:val>
+                                            <p:strVal val="#ppt_x"/>
+                                          </p:val>
+                                        </p:tav>
+                                        <p:tav tm="100000">
+                                          <p:val>
+                                            <p:strVal val="#ppt_x"/>
+                                          </p:val>
+                                        </p:tav>
+                                      </p:tavLst>
+                                    </p:anim>
+                                    <p:anim calcmode="lin" valueType="num">
+                                      <p:cBhvr>
+                                        <p:cTn id="23" dur="500" fill="hold"/>
+                                        <p:tgtEl>
+                                          <p:spTgt spid="3">
+                                            <p:txEl>
+                                              <p:pRg st="2" end="2"/>
+                                            </p:txEl>
+                                          </p:spTgt>
+                                        </p:tgtEl>
+                                        <p:attrNameLst>
+                                          <p:attrName>ppt_y</p:attrName>
+                                        </p:attrNameLst>
+                                      </p:cBhvr>
+                                      <p:tavLst>
+                                        <p:tav tm="0">
+                                          <p:val>
+                                            <p:strVal val="#ppt_y+.1"/>
+                                          </p:val>
+                                        </p:tav>
+                                        <p:tav tm="100000">
+                                          <p:val>
+                                            <p:strVal val="#ppt_y"/>
+                                          </p:val>
+                                        </p:tav>
+                                      </p:tavLst>
+                                    </p:anim>
+                                  </p:childTnLst>
+                                </p:cTn>
+                              </p:par>
+                            </p:childTnLst>
+                          </p:cTn>
+                        </p:par>
+                      </p:childTnLst>
+                    </p:cTn>
+                  </p:par>
+                  <p:par>
+                    <p:cTn id="24" fill="hold">
+                      <p:stCondLst>
+                        <p:cond delay="indefinite"/>
+                      </p:stCondLst>
+                      <p:childTnLst>
+                        <p:par>
+                          <p:cTn id="25" fill="hold">
+                            <p:stCondLst>
+                              <p:cond delay="0"/>
+                            </p:stCondLst>
+                            <p:childTnLst>
+                              <p:par>
+                                <p:cTn id="26" presetID="42" presetClass="entr" presetSubtype="0" fill="hold" grpId="0" nodeType="clickEffect">
+                                  <p:stCondLst>
+                                    <p:cond delay="0"/>
+                                  </p:stCondLst>
+                                  <p:childTnLst>
+                                    <p:set>
+                                      <p:cBhvr>
+                                        <p:cTn id="27" dur="1" fill="hold">
+                                          <p:stCondLst>
+                                            <p:cond delay="0"/>
+                                          </p:stCondLst>
+                                        </p:cTn>
+                                        <p:tgtEl>
+                                          <p:spTgt spid="3">
+                                            <p:txEl>
+                                              <p:pRg st="3" end="3"/>
+                                            </p:txEl>
+                                          </p:spTgt>
+                                        </p:tgtEl>
+                                        <p:attrNameLst>
+                                          <p:attrName>style.visibility</p:attrName>
+                                        </p:attrNameLst>
+                                      </p:cBhvr>
+                                      <p:to>
+                                        <p:strVal val="visible"/>
+                                      </p:to>
+                                    </p:set>
+                                    <p:animEffect transition="in" filter="fade">
+                                      <p:cBhvr>
+                                        <p:cTn id="28" dur="500"/>
+                                        <p:tgtEl>
+                                          <p:spTgt spid="3">
+                                            <p:txEl>
+                                              <p:pRg st="3" end="3"/>
+                                            </p:txEl>
+                                          </p:spTgt>
+                                        </p:tgtEl>
+                                      </p:cBhvr>
+                                    </p:animEffect>
+                                    <p:anim calcmode="lin" valueType="num">
+                                      <p:cBhvr>
+                                        <p:cTn id="29" dur="500" fill="hold"/>
+                                        <p:tgtEl>
+                                          <p:spTgt spid="3">
+                                            <p:txEl>
+                                              <p:pRg st="3" end="3"/>
+                                            </p:txEl>
+                                          </p:spTgt>
+                                        </p:tgtEl>
+                                        <p:attrNameLst>
+                                          <p:attrName>ppt_x</p:attrName>
+                                        </p:attrNameLst>
+                                      </p:cBhvr>
+                                      <p:tavLst>
+                                        <p:tav tm="0">
+                                          <p:val>
+                                            <p:strVal val="#ppt_x"/>
+                                          </p:val>
+                                        </p:tav>
+                                        <p:tav tm="100000">
+                                          <p:val>
+                                            <p:strVal val="#ppt_x"/>
+                                          </p:val>
+                                        </p:tav>
+                                      </p:tavLst>
+                                    </p:anim>
+                                    <p:anim calcmode="lin" valueType="num">
+                                      <p:cBhvr>
+                                        <p:cTn id="30" dur="500" fill="hold"/>
+                                        <p:tgtEl>
+                                          <p:spTgt spid="3">
+                                            <p:txEl>
+                                              <p:pRg st="3" end="3"/>
+                                            </p:txEl>
+                                          </p:spTgt>
+                                        </p:tgtEl>
+                                        <p:attrNameLst>
+                                          <p:attrName>ppt_y</p:attrName>
+                                        </p:attrNameLst>
+                                      </p:cBhvr>
+                                      <p:tavLst>
+                                        <p:tav tm="0">
+                                          <p:val>
+                                            <p:strVal val="#ppt_y+.1"/>
+                                          </p:val>
+                                        </p:tav>
+                                        <p:tav tm="100000">
+                                          <p:val>
+                                            <p:strVal val="#ppt_y"/>
+                                          </p:val>
+                                        </p:tav>
+                                      </p:tavLst>
+                                    </p:anim>
+                                  </p:childTnLst>
+                                </p:cTn>
+                              </p:par>
+                            </p:childTnLst>
+                          </p:cTn>
+                        </p:par>
+                      </p:childTnLst>
+                    </p:cTn>
+                  </p:par>
+                  <p:par>
+                    <p:cTn id="31" fill="hold">
+                      <p:stCondLst>
+                        <p:cond delay="indefinite"/>
+                      </p:stCondLst>
+                      <p:childTnLst>
+                        <p:par>
+                          <p:cTn id="32" fill="hold">
+                            <p:stCondLst>
+                              <p:cond delay="0"/>
+                            </p:stCondLst>
+                            <p:childTnLst>
+                              <p:par>
+                                <p:cTn id="33" presetID="42" presetClass="entr" presetSubtype="0" fill="hold" grpId="0" nodeType="clickEffect">
+                                  <p:stCondLst>
+                                    <p:cond delay="0"/>
+                                  </p:stCondLst>
+                                  <p:childTnLst>
+                                    <p:set>
+                                      <p:cBhvr>
+                                        <p:cTn id="34" dur="1" fill="hold">
+                                          <p:stCondLst>
+                                            <p:cond delay="0"/>
+                                          </p:stCondLst>
+                                        </p:cTn>
+                                        <p:tgtEl>
+                                          <p:spTgt spid="3">
+                                            <p:txEl>
+                                              <p:pRg st="4" end="4"/>
+                                            </p:txEl>
+                                          </p:spTgt>
+                                        </p:tgtEl>
+                                        <p:attrNameLst>
+                                          <p:attrName>style.visibility</p:attrName>
+                                        </p:attrNameLst>
+                                      </p:cBhvr>
+                                      <p:to>
+                                        <p:strVal val="visible"/>
+                                      </p:to>
+                                    </p:set>
+                                    <p:animEffect transition="in" filter="fade">
+                                      <p:cBhvr>
+                                        <p:cTn id="35" dur="500"/>
+                                        <p:tgtEl>
+                                          <p:spTgt spid="3">
+                                            <p:txEl>
+                                              <p:pRg st="4" end="4"/>
+                                            </p:txEl>
+                                          </p:spTgt>
+                                        </p:tgtEl>
+                                      </p:cBhvr>
+                                    </p:animEffect>
+                                    <p:anim calcmode="lin" valueType="num">
+                                      <p:cBhvr>
+                                        <p:cTn id="36" dur="500" fill="hold"/>
+                                        <p:tgtEl>
+                                          <p:spTgt spid="3">
+                                            <p:txEl>
+                                              <p:pRg st="4" end="4"/>
+                                            </p:txEl>
+                                          </p:spTgt>
+                                        </p:tgtEl>
+                                        <p:attrNameLst>
+                                          <p:attrName>ppt_x</p:attrName>
+                                        </p:attrNameLst>
+                                      </p:cBhvr>
+                                      <p:tavLst>
+                                        <p:tav tm="0">
+                                          <p:val>
+                                            <p:strVal val="#ppt_x"/>
+                                          </p:val>
+                                        </p:tav>
+                                        <p:tav tm="100000">
+                                          <p:val>
+                                            <p:strVal val="#ppt_x"/>
+                                          </p:val>
+                                        </p:tav>
+                                      </p:tavLst>
+                                    </p:anim>
+                                    <p:anim calcmode="lin" valueType="num">
+                                      <p:cBhvr>
+                                        <p:cTn id="37" dur="500" fill="hold"/>
+                                        <p:tgtEl>
+                                          <p:spTgt spid="3">
+                                            <p:txEl>
+                                              <p:pRg st="4" end="4"/>
+                                            </p:txEl>
+                                          </p:spTgt>
+                                        </p:tgtEl>
+                                        <p:attrNameLst>
+                                          <p:attrName>ppt_y</p:attrName>
+                                        </p:attrNameLst>
+                                      </p:cBhvr>
+                                      <p:tavLst>
+                                        <p:tav tm="0">
+                                          <p:val>
+                                            <p:strVal val="#ppt_y+.1"/>
+                                          </p:val>
+                                        </p:tav>
+                                        <p:tav tm="100000">
+                                          <p:val>
+                                            <p:strVal val="#ppt_y"/>
+                                          </p:val>
+                                        </p:tav>
+                                      </p:tavLst>
+                                    </p:anim>
+                                  </p:childTnLst>
+                                </p:cTn>
+                              </p:par>
+                            </p:childTnLst>
+                          </p:cTn>
+                        </p:par>
+                      </p:childTnLst>
+                    </p:cTn>
+                  </p:par>
+                  <p:par>
+                    <p:cTn id="38" fill="hold">
+                      <p:stCondLst>
+                        <p:cond delay="indefinite"/>
+                      </p:stCondLst>
+                      <p:childTnLst>
+                        <p:par>
+                          <p:cTn id="39" fill="hold">
+                            <p:stCondLst>
+                              <p:cond delay="0"/>
+                            </p:stCondLst>
+                            <p:childTnLst>
+                              <p:par>
+                                <p:cTn id="40" presetID="42" presetClass="entr" presetSubtype="0" fill="hold" grpId="0" nodeType="clickEffect">
+                                  <p:stCondLst>
+                                    <p:cond delay="0"/>
+                                  </p:stCondLst>
+                                  <p:childTnLst>
+                                    <p:set>
+                                      <p:cBhvr>
+                                        <p:cTn id="41" dur="1" fill="hold">
+                                          <p:stCondLst>
+                                            <p:cond delay="0"/>
+                                          </p:stCondLst>
+                                        </p:cTn>
+                                        <p:tgtEl>
+                                          <p:spTgt spid="3">
+                                            <p:txEl>
+                                              <p:pRg st="5" end="5"/>
+                                            </p:txEl>
+                                          </p:spTgt>
+                                        </p:tgtEl>
+                                        <p:attrNameLst>
+                                          <p:attrName>style.visibility</p:attrName>
+                                        </p:attrNameLst>
+                                      </p:cBhvr>
+                                      <p:to>
+                                        <p:strVal val="visible"/>
+                                      </p:to>
+                                    </p:set>
+                                    <p:animEffect transition="in" filter="fade">
+                                      <p:cBhvr>
+                                        <p:cTn id="42" dur="500"/>
+                                        <p:tgtEl>
+                                          <p:spTgt spid="3">
+                                            <p:txEl>
+                                              <p:pRg st="5" end="5"/>
+                                            </p:txEl>
+                                          </p:spTgt>
+                                        </p:tgtEl>
+                                      </p:cBhvr>
+                                    </p:animEffect>
+                                    <p:anim calcmode="lin" valueType="num">
+                                      <p:cBhvr>
+                                        <p:cTn id="43" dur="500" fill="hold"/>
+                                        <p:tgtEl>
+                                          <p:spTgt spid="3">
+                                            <p:txEl>
+                                              <p:pRg st="5" end="5"/>
+                                            </p:txEl>
+                                          </p:spTgt>
+                                        </p:tgtEl>
+                                        <p:attrNameLst>
+                                          <p:attrName>ppt_x</p:attrName>
+                                        </p:attrNameLst>
+                                      </p:cBhvr>
+                                      <p:tavLst>
+                                        <p:tav tm="0">
+                                          <p:val>
+                                            <p:strVal val="#ppt_x"/>
+                                          </p:val>
+                                        </p:tav>
+                                        <p:tav tm="100000">
+                                          <p:val>
+                                            <p:strVal val="#ppt_x"/>
+                                          </p:val>
+                                        </p:tav>
+                                      </p:tavLst>
+                                    </p:anim>
+                                    <p:anim calcmode="lin" valueType="num">
+                                      <p:cBhvr>
+                                        <p:cTn id="44" dur="500" fill="hold"/>
+                                        <p:tgtEl>
+                                          <p:spTgt spid="3">
+                                            <p:txEl>
+                                              <p:pRg st="5" end="5"/>
+                                            </p:txEl>
+                                          </p:spTgt>
+                                        </p:tgtEl>
+                                        <p:attrNameLst>
+                                          <p:attrName>ppt_y</p:attrName>
+                                        </p:attrNameLst>
+                                      </p:cBhvr>
+                                      <p:tavLst>
+                                        <p:tav tm="0">
+                                          <p:val>
+                                            <p:strVal val="#ppt_y+.1"/>
+                                          </p:val>
+                                        </p:tav>
+                                        <p:tav tm="100000">
+                                          <p:val>
+                                            <p:strVal val="#ppt_y"/>
+                                          </p:val>
+                                        </p:tav>
+                                      </p:tavLst>
+                                    </p:anim>
+                                  </p:childTnLst>
+                                </p:cTn>
+                              </p:par>
+                            </p:childTnLst>
+                          </p:cTn>
+                        </p:par>
+                      </p:childTnLst>
+                    </p:cTn>
+                  </p:par>
+                  <p:par>
+                    <p:cTn id="45" fill="hold">
+                      <p:stCondLst>
+                        <p:cond delay="indefinite"/>
+                      </p:stCondLst>
+                      <p:childTnLst>
+                        <p:par>
+                          <p:cTn id="46" fill="hold">
+                            <p:stCondLst>
+                              <p:cond delay="0"/>
+                            </p:stCondLst>
+                            <p:childTnLst>
+                              <p:par>
+                                <p:cTn id="47" presetID="2" presetClass="entr" presetSubtype="4" fill="hold" nodeType="clickEffect">
+                                  <p:stCondLst>
+                                    <p:cond delay="0"/>
+                                  </p:stCondLst>
+                                  <p:childTnLst>
+                                    <p:set>
+                                      <p:cBhvr>
+                                        <p:cTn id="48" dur="1" fill="hold">
+                                          <p:stCondLst>
+                                            <p:cond delay="0"/>
+                                          </p:stCondLst>
+                                        </p:cTn>
+                                        <p:tgtEl>
+                                          <p:spTgt spid="7170"/>
+                                        </p:tgtEl>
+                                        <p:attrNameLst>
+                                          <p:attrName>style.visibility</p:attrName>
+                                        </p:attrNameLst>
+                                      </p:cBhvr>
+                                      <p:to>
+                                        <p:strVal val="visible"/>
+                                      </p:to>
+                                    </p:set>
+                                    <p:anim calcmode="lin" valueType="num">
+                                      <p:cBhvr additive="base">
+                                        <p:cTn id="49" dur="500" fill="hold"/>
+                                        <p:tgtEl>
+                                          <p:spTgt spid="7170"/>
+                                        </p:tgtEl>
+                                        <p:attrNameLst>
+                                          <p:attrName>ppt_x</p:attrName>
+                                        </p:attrNameLst>
+                                      </p:cBhvr>
+                                      <p:tavLst>
+                                        <p:tav tm="0">
+                                          <p:val>
+                                            <p:strVal val="#ppt_x"/>
+                                          </p:val>
+                                        </p:tav>
+                                        <p:tav tm="100000">
+                                          <p:val>
+                                            <p:strVal val="#ppt_x"/>
+                                          </p:val>
+                                        </p:tav>
+                                      </p:tavLst>
+                                    </p:anim>
+                                    <p:anim calcmode="lin" valueType="num">
+                                      <p:cBhvr additive="base">
+                                        <p:cTn id="50" dur="500" fill="hold"/>
+                                        <p:tgtEl>
+                                          <p:spTgt spid="7170"/>
+                                        </p:tgtEl>
+                                        <p:attrNameLst>
+                                          <p:attrName>ppt_y</p:attrName>
+                                        </p:attrNameLst>
+                                      </p:cBhvr>
+                                      <p:tavLst>
+                                        <p:tav tm="0">
+                                          <p:val>
+                                            <p:strVal val="1+#ppt_h/2"/>
+                                          </p:val>
+                                        </p:tav>
+                                        <p:tav tm="100000">
+                                          <p:val>
+                                            <p:strVal val="#ppt_y"/>
+                                          </p:val>
+                                        </p:tav>
+                                      </p:tavLst>
+                                    </p:anim>
+                                  </p:childTnLst>
+                                </p:cTn>
+                              </p:par>
+                            </p:childTnLst>
+                          </p:cTn>
+                        </p:par>
+                      </p:childTnLst>
+                    </p:cTn>
+                  </p:par>
+                </p:childTnLst>
+              </p:cTn>
+              <p:prevCondLst>
+                <p:cond evt="onPrev" delay="0">
+                  <p:tgtEl>
+                    <p:sldTgt/>
+                  </p:tgtEl>
+                </p:cond>
+              </p:prevCondLst>
+              <p:nextCondLst>
+                <p:cond evt="onNext" delay="0">
+                  <p:tgtEl>
+                    <p:sldTgt/>
+                  </p:tgtEl>
+                </p:cond>
+              </p:nextCondLst>
+            </p:seq>
+          </p:childTnLst>
+        </p:cTn>
+      </p:par>
+    </p:tnLst>
+    <p:bldLst>
+      <p:bldP spid="3" grpId="0" uiExpand="1" build="p"/>
+    </p:bldLst>
+  </p:timing>
+</p:sld>
+</file>
+
+<file path=ppt/slides/slide16.xml><?xml version="1.0" encoding="utf-8"?>
+<p:sld xmlns:a="http://schemas.openxmlformats.org/drawingml/2006/main" xmlns:r="http://schemas.openxmlformats.org/officeDocument/2006/relationships" xmlns:p="http://schemas.openxmlformats.org/presentationml/2006/main">
+  <p:cSld>
+    <p:spTree>
+      <p:nvGrpSpPr>
+        <p:cNvPr id="1" name=""/>
+        <p:cNvGrpSpPr/>
+        <p:nvPr/>
+      </p:nvGrpSpPr>
+      <p:grpSpPr>
+        <a:xfrm>
+          <a:off x="0" y="0"/>
+          <a:ext cx="0" cy="0"/>
+          <a:chOff x="0" y="0"/>
+          <a:chExt cx="0" cy="0"/>
+        </a:xfrm>
+      </p:grpSpPr>
+      <p:sp>
+        <p:nvSpPr>
+          <p:cNvPr id="2" name="Text Placeholder 1">
+            <a:extLst>
+              <a:ext uri="{FF2B5EF4-FFF2-40B4-BE49-F238E27FC236}">
+                <a16:creationId xmlns:a16="http://schemas.microsoft.com/office/drawing/2014/main" id="{173CE56B-1F2D-4371-AAB5-66C635D6FB6D}"/>
+              </a:ext>
+            </a:extLst>
+          </p:cNvPr>
+          <p:cNvSpPr>
+            <a:spLocks noGrp="1"/>
+          </p:cNvSpPr>
+          <p:nvPr>
+            <p:ph type="body" sz="quarter" idx="10"/>
+          </p:nvPr>
+        </p:nvSpPr>
+        <p:spPr/>
+        <p:txBody>
+          <a:bodyPr/>
+          <a:lstStyle/>
+          <a:p>
+            <a:r>
+              <a:rPr lang="en-US" dirty="0"/>
+              <a:t>Questions?</a:t>
+            </a:r>
+          </a:p>
+        </p:txBody>
+      </p:sp>
+    </p:spTree>
+    <p:extLst>
+      <p:ext uri="{BB962C8B-B14F-4D97-AF65-F5344CB8AC3E}">
+        <p14:creationId xmlns:p14="http://schemas.microsoft.com/office/powerpoint/2010/main" val="2318062098"/>
+      </p:ext>
+    </p:extLst>
+  </p:cSld>
+  <p:clrMapOvr>
+    <a:masterClrMapping/>
+  </p:clrMapOvr>
+  <p:transition>
+    <p:fade/>
+  </p:transition>
+</p:sld>
+</file>
+
 <file path=ppt/slides/slide2.xml><?xml version="1.0" encoding="utf-8"?>
 <p:sld xmlns:a="http://schemas.openxmlformats.org/drawingml/2006/main" xmlns:r="http://schemas.openxmlformats.org/officeDocument/2006/relationships" xmlns:p="http://schemas.openxmlformats.org/presentationml/2006/main">
   <p:cSld>
@@ -38423,7 +39702,7 @@
           <a:p>
             <a:r>
               <a:rPr lang="en-US" dirty="0"/>
-              <a:t>Python is named after “Monty Python’s Flying Circus”</a:t>
+              <a:t>Python is named after Monty Python</a:t>
             </a:r>
           </a:p>
           <a:p>
@@ -39564,6 +40843,97 @@
   <p:transition spd="med">
     <p:pull/>
   </p:transition>
+  <p:timing>
+    <p:tnLst>
+      <p:par>
+        <p:cTn id="1" dur="indefinite" restart="never" nodeType="tmRoot">
+          <p:childTnLst>
+            <p:seq concurrent="1" nextAc="seek">
+              <p:cTn id="2" dur="indefinite" nodeType="mainSeq">
+                <p:childTnLst>
+                  <p:par>
+                    <p:cTn id="3" fill="hold">
+                      <p:stCondLst>
+                        <p:cond delay="indefinite"/>
+                      </p:stCondLst>
+                      <p:childTnLst>
+                        <p:par>
+                          <p:cTn id="4" fill="hold">
+                            <p:stCondLst>
+                              <p:cond delay="0"/>
+                            </p:stCondLst>
+                            <p:childTnLst>
+                              <p:par>
+                                <p:cTn id="5" presetID="10" presetClass="entr" presetSubtype="0" fill="hold" nodeType="clickEffect">
+                                  <p:stCondLst>
+                                    <p:cond delay="0"/>
+                                  </p:stCondLst>
+                                  <p:childTnLst>
+                                    <p:set>
+                                      <p:cBhvr>
+                                        <p:cTn id="6" dur="1" fill="hold">
+                                          <p:stCondLst>
+                                            <p:cond delay="0"/>
+                                          </p:stCondLst>
+                                        </p:cTn>
+                                        <p:tgtEl>
+                                          <p:spTgt spid="7">
+                                            <p:txEl>
+                                              <p:pRg st="5" end="5"/>
+                                            </p:txEl>
+                                          </p:spTgt>
+                                        </p:tgtEl>
+                                        <p:attrNameLst>
+                                          <p:attrName>style.visibility</p:attrName>
+                                        </p:attrNameLst>
+                                      </p:cBhvr>
+                                      <p:to>
+                                        <p:strVal val="visible"/>
+                                      </p:to>
+                                    </p:set>
+                                    <p:animEffect transition="in" filter="fade">
+                                      <p:cBhvr>
+                                        <p:cTn id="7" dur="500"/>
+                                        <p:tgtEl>
+                                          <p:spTgt spid="7">
+                                            <p:txEl>
+                                              <p:pRg st="5" end="5"/>
+                                            </p:txEl>
+                                          </p:spTgt>
+                                        </p:tgtEl>
+                                      </p:cBhvr>
+                                    </p:animEffect>
+                                  </p:childTnLst>
+                                </p:cTn>
+                              </p:par>
+                            </p:childTnLst>
+                          </p:cTn>
+                        </p:par>
+                      </p:childTnLst>
+                    </p:cTn>
+                  </p:par>
+                </p:childTnLst>
+              </p:cTn>
+              <p:prevCondLst>
+                <p:cond evt="onPrev" delay="0">
+                  <p:tgtEl>
+                    <p:sldTgt/>
+                  </p:tgtEl>
+                </p:cond>
+              </p:prevCondLst>
+              <p:nextCondLst>
+                <p:cond evt="onNext" delay="0">
+                  <p:tgtEl>
+                    <p:sldTgt/>
+                  </p:tgtEl>
+                </p:cond>
+              </p:nextCondLst>
+            </p:seq>
+          </p:childTnLst>
+        </p:cTn>
+      </p:par>
+    </p:tnLst>
+  </p:timing>
 </p:sld>
 </file>
 
@@ -40821,22 +42191,13 @@
               <a:buNone/>
             </a:pPr>
             <a:r>
-              <a:rPr lang="en-US" sz="4800" dirty="0" err="1">
-                <a:solidFill>
-                  <a:srgbClr val="000000"/>
-                </a:solidFill>
-                <a:latin typeface="Consolas" panose="020B0609020204030204" pitchFamily="49" charset="0"/>
-              </a:rPr>
-              <a:t>my_name</a:t>
-            </a:r>
-            <a:r>
               <a:rPr lang="en-US" sz="4800" dirty="0">
                 <a:solidFill>
                   <a:srgbClr val="000000"/>
                 </a:solidFill>
                 <a:latin typeface="Consolas" panose="020B0609020204030204" pitchFamily="49" charset="0"/>
               </a:rPr>
-              <a:t> = </a:t>
+              <a:t>person = </a:t>
             </a:r>
             <a:r>
               <a:rPr lang="en-US" sz="4800" dirty="0">
@@ -40883,25 +42244,7 @@
                 </a:solidFill>
                 <a:latin typeface="Consolas" panose="020B0609020204030204" pitchFamily="49" charset="0"/>
               </a:rPr>
-              <a:t> + </a:t>
-            </a:r>
-            <a:r>
-              <a:rPr lang="en-US" sz="4800" dirty="0" err="1">
-                <a:solidFill>
-                  <a:srgbClr val="000000"/>
-                </a:solidFill>
-                <a:latin typeface="Consolas" panose="020B0609020204030204" pitchFamily="49" charset="0"/>
-              </a:rPr>
-              <a:t>my_name</a:t>
-            </a:r>
-            <a:r>
-              <a:rPr lang="en-US" sz="4800" dirty="0">
-                <a:solidFill>
-                  <a:srgbClr val="000000"/>
-                </a:solidFill>
-                <a:latin typeface="Consolas" panose="020B0609020204030204" pitchFamily="49" charset="0"/>
-              </a:rPr>
-              <a:t>)</a:t>
+              <a:t> + person)</a:t>
             </a:r>
           </a:p>
           <a:p>
@@ -41162,22 +42505,13 @@
               <a:buNone/>
             </a:pPr>
             <a:r>
-              <a:rPr lang="en-US" sz="4800" dirty="0" err="1">
-                <a:solidFill>
-                  <a:srgbClr val="000000"/>
-                </a:solidFill>
-                <a:latin typeface="Consolas" panose="020B0609020204030204" pitchFamily="49" charset="0"/>
-              </a:rPr>
-              <a:t>my_name</a:t>
-            </a:r>
-            <a:r>
               <a:rPr lang="en-US" sz="4800" dirty="0">
                 <a:solidFill>
                   <a:srgbClr val="000000"/>
                 </a:solidFill>
                 <a:latin typeface="Consolas" panose="020B0609020204030204" pitchFamily="49" charset="0"/>
               </a:rPr>
-              <a:t> = </a:t>
+              <a:t>person = </a:t>
             </a:r>
             <a:r>
               <a:rPr lang="en-US" sz="4800" dirty="0">
@@ -41224,25 +42558,7 @@
                 </a:solidFill>
                 <a:latin typeface="Consolas" panose="020B0609020204030204" pitchFamily="49" charset="0"/>
               </a:rPr>
-              <a:t> + </a:t>
-            </a:r>
-            <a:r>
-              <a:rPr lang="en-US" sz="4800" dirty="0" err="1">
-                <a:solidFill>
-                  <a:srgbClr val="000000"/>
-                </a:solidFill>
-                <a:latin typeface="Consolas" panose="020B0609020204030204" pitchFamily="49" charset="0"/>
-              </a:rPr>
-              <a:t>my_name</a:t>
-            </a:r>
-            <a:r>
-              <a:rPr lang="en-US" sz="4800" dirty="0">
-                <a:solidFill>
-                  <a:srgbClr val="000000"/>
-                </a:solidFill>
-                <a:latin typeface="Consolas" panose="020B0609020204030204" pitchFamily="49" charset="0"/>
-              </a:rPr>
-              <a:t>)</a:t>
+              <a:t> + person)</a:t>
             </a:r>
           </a:p>
           <a:p>
@@ -41271,16 +42587,16 @@
             </a:r>
             <a:r>
               <a:rPr lang="en-US" sz="3600" dirty="0"/>
-              <a:t> here is </a:t>
+              <a:t> here is named </a:t>
             </a:r>
             <a:r>
-              <a:rPr lang="en-US" sz="3600" dirty="0" err="1">
+              <a:rPr lang="en-US" sz="3600" dirty="0">
                 <a:solidFill>
                   <a:srgbClr val="000000"/>
                 </a:solidFill>
                 <a:latin typeface="Consolas" panose="020B0609020204030204" pitchFamily="49" charset="0"/>
               </a:rPr>
-              <a:t>my_name</a:t>
+              <a:t>person</a:t>
             </a:r>
             <a:r>
               <a:rPr lang="en-US" sz="3600" dirty="0"/>

</xml_diff>